<commit_message>
[ * ] ImageForm 크기조절/확대
</commit_message>
<xml_diff>
--- a/캡스톤디자인_5주차.pptx
+++ b/캡스톤디자인_5주차.pptx
@@ -5,7 +5,7 @@
     <p:sldMasterId id="2147483648" r:id="rId1"/>
   </p:sldMasterIdLst>
   <p:notesMasterIdLst>
-    <p:notesMasterId r:id="rId16"/>
+    <p:notesMasterId r:id="rId17"/>
   </p:notesMasterIdLst>
   <p:sldIdLst>
     <p:sldId id="266" r:id="rId2"/>
@@ -18,10 +18,11 @@
     <p:sldId id="269" r:id="rId9"/>
     <p:sldId id="270" r:id="rId10"/>
     <p:sldId id="271" r:id="rId11"/>
-    <p:sldId id="272" r:id="rId12"/>
-    <p:sldId id="275" r:id="rId13"/>
-    <p:sldId id="276" r:id="rId14"/>
-    <p:sldId id="279" r:id="rId15"/>
+    <p:sldId id="280" r:id="rId12"/>
+    <p:sldId id="272" r:id="rId13"/>
+    <p:sldId id="275" r:id="rId14"/>
+    <p:sldId id="276" r:id="rId15"/>
+    <p:sldId id="279" r:id="rId16"/>
   </p:sldIdLst>
   <p:sldSz cx="18288000" cy="10287000"/>
   <p:notesSz cx="10287000" cy="18288000"/>
@@ -221,7 +222,7 @@
           <a:p>
             <a:fld id="{C875CFF0-5C74-456C-A221-ABE615619F72}" type="datetimeFigureOut">
               <a:rPr lang="ko-KR" altLang="en-US" smtClean="0"/>
-              <a:t>2021-09-29</a:t>
+              <a:t>2021-09-30</a:t>
             </a:fld>
             <a:endParaRPr lang="ko-KR" altLang="en-US"/>
           </a:p>
@@ -638,66 +639,23 @@
           <a:p>
             <a:r>
               <a:rPr lang="ko-KR" altLang="en-US" dirty="0"/>
-              <a:t>학생이 문제를 풀고 전달하면 그 내용을 확인한다</a:t>
+              <a:t>질문은 하나만</a:t>
             </a:r>
             <a:r>
               <a:rPr lang="en-US" altLang="ko-KR" dirty="0"/>
-              <a:t>.</a:t>
+              <a:t>,</a:t>
             </a:r>
             <a:r>
               <a:rPr lang="ko-KR" altLang="en-US" dirty="0"/>
-              <a:t> </a:t>
+              <a:t> 학생들을 선택해서 전송할 수 있다</a:t>
             </a:r>
             <a:r>
               <a:rPr lang="en-US" altLang="ko-KR" dirty="0"/>
-              <a:t>-</a:t>
+              <a:t>.( </a:t>
             </a:r>
             <a:r>
               <a:rPr lang="ko-KR" altLang="en-US" dirty="0"/>
-              <a:t>피드백도 가능하게 구현</a:t>
-            </a:r>
-            <a:r>
-              <a:rPr lang="en-US" altLang="ko-KR" dirty="0"/>
-              <a:t>(</a:t>
-            </a:r>
-            <a:r>
-              <a:rPr lang="ko-KR" altLang="en-US" dirty="0"/>
-              <a:t>예정</a:t>
-            </a:r>
-            <a:r>
-              <a:rPr lang="en-US" altLang="ko-KR" dirty="0"/>
-              <a:t>).</a:t>
-            </a:r>
-          </a:p>
-          <a:p>
-            <a:pPr marL="228600" marR="0" lvl="0" indent="-228600" algn="l" defTabSz="914400" rtl="0" eaLnBrk="1" fontAlgn="auto" latinLnBrk="1" hangingPunct="1">
-              <a:lnSpc>
-                <a:spcPct val="100000"/>
-              </a:lnSpc>
-              <a:spcBef>
-                <a:spcPts val="0"/>
-              </a:spcBef>
-              <a:spcAft>
-                <a:spcPts val="0"/>
-              </a:spcAft>
-              <a:buClrTx/>
-              <a:buSzTx/>
-              <a:buFontTx/>
-              <a:buAutoNum type="arabicPeriod"/>
-              <a:tabLst/>
-              <a:defRPr/>
-            </a:pPr>
-            <a:r>
-              <a:rPr lang="ko-KR" altLang="en-US" dirty="0"/>
-              <a:t>학생 정보 </a:t>
-            </a:r>
-            <a:r>
-              <a:rPr lang="en-US" altLang="ko-KR" dirty="0"/>
-              <a:t>(</a:t>
-            </a:r>
-            <a:r>
-              <a:rPr lang="ko-KR" altLang="en-US" dirty="0"/>
-              <a:t>이름</a:t>
+              <a:t>단답형</a:t>
             </a:r>
             <a:r>
               <a:rPr lang="en-US" altLang="ko-KR" dirty="0"/>
@@ -705,35 +663,32 @@
             </a:r>
             <a:r>
               <a:rPr lang="ko-KR" altLang="en-US" dirty="0"/>
-              <a:t>학번</a:t>
+              <a:t>주관식</a:t>
             </a:r>
             <a:r>
               <a:rPr lang="en-US" altLang="ko-KR" dirty="0"/>
-              <a:t>) </a:t>
+              <a:t>, OX</a:t>
             </a:r>
             <a:r>
               <a:rPr lang="ko-KR" altLang="en-US" dirty="0"/>
-              <a:t>표시</a:t>
-            </a:r>
-            <a:endParaRPr lang="en-US" altLang="ko-KR" dirty="0"/>
-          </a:p>
-          <a:p>
-            <a:pPr marL="228600" marR="0" lvl="0" indent="-228600" algn="l" defTabSz="914400" rtl="0" eaLnBrk="1" fontAlgn="auto" latinLnBrk="1" hangingPunct="1">
-              <a:lnSpc>
-                <a:spcPct val="100000"/>
-              </a:lnSpc>
-              <a:spcBef>
-                <a:spcPts val="0"/>
-              </a:spcBef>
-              <a:spcAft>
-                <a:spcPts val="0"/>
-              </a:spcAft>
-              <a:buClrTx/>
-              <a:buSzTx/>
-              <a:buFontTx/>
+              <a:t>문제 </a:t>
+            </a:r>
+            <a:r>
+              <a:rPr lang="en-US" altLang="ko-KR" dirty="0"/>
+              <a:t>: </a:t>
+            </a:r>
+            <a:r>
+              <a:rPr lang="ko-KR" altLang="en-US" dirty="0"/>
+              <a:t>문제유형도 달라짐</a:t>
+            </a:r>
+            <a:r>
+              <a:rPr lang="en-US" altLang="ko-KR" dirty="0"/>
+              <a:t>.)</a:t>
+            </a:r>
+          </a:p>
+          <a:p>
+            <a:pPr marL="228600" indent="-228600">
               <a:buAutoNum type="arabicPeriod"/>
-              <a:tabLst/>
-              <a:defRPr/>
             </a:pPr>
             <a:r>
               <a:rPr lang="en-US" altLang="ko-KR" dirty="0" err="1"/>
@@ -741,48 +696,99 @@
             </a:r>
             <a:r>
               <a:rPr lang="en-US" altLang="ko-KR" dirty="0"/>
-              <a:t> / radio</a:t>
+              <a:t> :</a:t>
             </a:r>
             <a:r>
               <a:rPr lang="ko-KR" altLang="en-US" dirty="0"/>
-              <a:t> </a:t>
+              <a:t> 교수님의 질문 작성</a:t>
+            </a:r>
+            <a:endParaRPr lang="en-US" altLang="ko-KR" dirty="0"/>
+          </a:p>
+          <a:p>
+            <a:pPr marL="228600" indent="-228600">
+              <a:buAutoNum type="arabicPeriod"/>
+            </a:pPr>
+            <a:r>
+              <a:rPr lang="en-US" altLang="ko-KR" dirty="0" err="1"/>
+              <a:t>RadioButton</a:t>
             </a:r>
             <a:r>
               <a:rPr lang="en-US" altLang="ko-KR" dirty="0"/>
-              <a:t>button : </a:t>
+              <a:t> : </a:t>
             </a:r>
             <a:r>
               <a:rPr lang="ko-KR" altLang="en-US" dirty="0"/>
-              <a:t>학생 답변 출력</a:t>
+              <a:t>질문 타입 </a:t>
+            </a:r>
+            <a:r>
+              <a:rPr lang="en-US" altLang="ko-KR" dirty="0"/>
+              <a:t>–</a:t>
+            </a:r>
+            <a:r>
+              <a:rPr lang="ko-KR" altLang="en-US" dirty="0"/>
+              <a:t>학생입력과</a:t>
+            </a:r>
+            <a:r>
+              <a:rPr lang="en-US" altLang="ko-KR" dirty="0"/>
+              <a:t> O/X </a:t>
+            </a:r>
+            <a:r>
+              <a:rPr lang="ko-KR" altLang="en-US" dirty="0"/>
+              <a:t>중 선택</a:t>
+            </a:r>
+            <a:r>
+              <a:rPr lang="en-US" altLang="ko-KR" dirty="0"/>
+              <a:t>1</a:t>
+            </a:r>
+          </a:p>
+          <a:p>
+            <a:pPr marL="228600" indent="-228600">
+              <a:buAutoNum type="arabicPeriod"/>
+            </a:pPr>
+            <a:r>
+              <a:rPr lang="en-US" altLang="ko-KR" dirty="0" err="1"/>
+              <a:t>GridView</a:t>
+            </a:r>
+            <a:r>
+              <a:rPr lang="en-US" altLang="ko-KR" dirty="0"/>
+              <a:t> : </a:t>
+            </a:r>
+            <a:r>
+              <a:rPr lang="ko-KR" altLang="en-US" dirty="0"/>
+              <a:t>전송할 학생 선택</a:t>
             </a:r>
             <a:endParaRPr lang="en-US" altLang="ko-KR" dirty="0"/>
           </a:p>
           <a:p>
-            <a:pPr marL="228600" marR="0" lvl="0" indent="-228600" algn="l" defTabSz="914400" rtl="0" eaLnBrk="1" fontAlgn="auto" latinLnBrk="1" hangingPunct="1">
-              <a:lnSpc>
-                <a:spcPct val="100000"/>
-              </a:lnSpc>
-              <a:spcBef>
-                <a:spcPts val="0"/>
-              </a:spcBef>
-              <a:spcAft>
-                <a:spcPts val="0"/>
-              </a:spcAft>
-              <a:buClrTx/>
-              <a:buSzTx/>
-              <a:buFontTx/>
+            <a:pPr marL="228600" indent="-228600">
               <a:buAutoNum type="arabicPeriod"/>
-              <a:tabLst/>
-              <a:defRPr/>
             </a:pPr>
             <a:r>
+              <a:rPr lang="en-US" altLang="ko-KR" dirty="0"/>
+              <a:t>Button : </a:t>
+            </a:r>
+            <a:r>
               <a:rPr lang="ko-KR" altLang="en-US" dirty="0"/>
-              <a:t>확인 버튼</a:t>
+              <a:t>전체 선택</a:t>
+            </a:r>
+            <a:r>
+              <a:rPr lang="en-US" altLang="ko-KR" dirty="0"/>
+              <a:t>/</a:t>
+            </a:r>
+            <a:r>
+              <a:rPr lang="ko-KR" altLang="en-US" dirty="0"/>
+              <a:t>전체 취소</a:t>
             </a:r>
             <a:endParaRPr lang="en-US" altLang="ko-KR" dirty="0"/>
           </a:p>
           <a:p>
-            <a:endParaRPr lang="en-US" altLang="ko-KR" dirty="0"/>
+            <a:pPr marL="228600" indent="-228600">
+              <a:buAutoNum type="arabicPeriod"/>
+            </a:pPr>
+            <a:r>
+              <a:rPr lang="ko-KR" altLang="en-US" dirty="0"/>
+              <a:t>전송 및 취소</a:t>
+            </a:r>
           </a:p>
         </p:txBody>
       </p:sp>
@@ -812,7 +818,7 @@
     </p:spTree>
     <p:extLst>
       <p:ext uri="{BB962C8B-B14F-4D97-AF65-F5344CB8AC3E}">
-        <p14:creationId xmlns:p14="http://schemas.microsoft.com/office/powerpoint/2010/main" val="1551599693"/>
+        <p14:creationId xmlns:p14="http://schemas.microsoft.com/office/powerpoint/2010/main" val="3716798818"/>
       </p:ext>
     </p:extLst>
   </p:cSld>
@@ -971,7 +977,15 @@
             </a:r>
             <a:r>
               <a:rPr lang="en-US" altLang="ko-KR" dirty="0"/>
-              <a:t> : </a:t>
+              <a:t> / radio</a:t>
+            </a:r>
+            <a:r>
+              <a:rPr lang="ko-KR" altLang="en-US" dirty="0"/>
+              <a:t> </a:t>
+            </a:r>
+            <a:r>
+              <a:rPr lang="en-US" altLang="ko-KR" dirty="0"/>
+              <a:t>button : </a:t>
             </a:r>
             <a:r>
               <a:rPr lang="ko-KR" altLang="en-US" dirty="0"/>
@@ -1026,6 +1040,228 @@
             <a:fld id="{76E558CC-66EE-4821-8800-2CB192EAF76D}" type="slidenum">
               <a:rPr lang="ko-KR" altLang="en-US" smtClean="0"/>
               <a:t>13</a:t>
+            </a:fld>
+            <a:endParaRPr lang="ko-KR" altLang="en-US"/>
+          </a:p>
+        </p:txBody>
+      </p:sp>
+    </p:spTree>
+    <p:extLst>
+      <p:ext uri="{BB962C8B-B14F-4D97-AF65-F5344CB8AC3E}">
+        <p14:creationId xmlns:p14="http://schemas.microsoft.com/office/powerpoint/2010/main" val="1551599693"/>
+      </p:ext>
+    </p:extLst>
+  </p:cSld>
+  <p:clrMapOvr>
+    <a:masterClrMapping/>
+  </p:clrMapOvr>
+</p:notes>
+</file>
+
+<file path=ppt/notesSlides/notesSlide12.xml><?xml version="1.0" encoding="utf-8"?>
+<p:notes xmlns:a="http://schemas.openxmlformats.org/drawingml/2006/main" xmlns:r="http://schemas.openxmlformats.org/officeDocument/2006/relationships" xmlns:p="http://schemas.openxmlformats.org/presentationml/2006/main">
+  <p:cSld>
+    <p:spTree>
+      <p:nvGrpSpPr>
+        <p:cNvPr id="1" name=""/>
+        <p:cNvGrpSpPr/>
+        <p:nvPr/>
+      </p:nvGrpSpPr>
+      <p:grpSpPr>
+        <a:xfrm>
+          <a:off x="0" y="0"/>
+          <a:ext cx="0" cy="0"/>
+          <a:chOff x="0" y="0"/>
+          <a:chExt cx="0" cy="0"/>
+        </a:xfrm>
+      </p:grpSpPr>
+      <p:sp>
+        <p:nvSpPr>
+          <p:cNvPr id="2" name="슬라이드 이미지 개체 틀 1"/>
+          <p:cNvSpPr>
+            <a:spLocks noGrp="1" noRot="1" noChangeAspect="1"/>
+          </p:cNvSpPr>
+          <p:nvPr>
+            <p:ph type="sldImg"/>
+          </p:nvPr>
+        </p:nvSpPr>
+        <p:spPr/>
+      </p:sp>
+      <p:sp>
+        <p:nvSpPr>
+          <p:cNvPr id="3" name="슬라이드 노트 개체 틀 2"/>
+          <p:cNvSpPr>
+            <a:spLocks noGrp="1"/>
+          </p:cNvSpPr>
+          <p:nvPr>
+            <p:ph type="body" idx="1"/>
+          </p:nvPr>
+        </p:nvSpPr>
+        <p:spPr/>
+        <p:txBody>
+          <a:bodyPr/>
+          <a:lstStyle/>
+          <a:p>
+            <a:r>
+              <a:rPr lang="ko-KR" altLang="en-US" dirty="0"/>
+              <a:t>학생이 문제를 풀고 전달하면 그 내용을 확인한다</a:t>
+            </a:r>
+            <a:r>
+              <a:rPr lang="en-US" altLang="ko-KR" dirty="0"/>
+              <a:t>.</a:t>
+            </a:r>
+            <a:r>
+              <a:rPr lang="ko-KR" altLang="en-US" dirty="0"/>
+              <a:t> </a:t>
+            </a:r>
+            <a:r>
+              <a:rPr lang="en-US" altLang="ko-KR" dirty="0"/>
+              <a:t>-</a:t>
+            </a:r>
+            <a:r>
+              <a:rPr lang="ko-KR" altLang="en-US" dirty="0"/>
+              <a:t>피드백도 가능하게 구현</a:t>
+            </a:r>
+            <a:r>
+              <a:rPr lang="en-US" altLang="ko-KR" dirty="0"/>
+              <a:t>(</a:t>
+            </a:r>
+            <a:r>
+              <a:rPr lang="ko-KR" altLang="en-US" dirty="0"/>
+              <a:t>예정</a:t>
+            </a:r>
+            <a:r>
+              <a:rPr lang="en-US" altLang="ko-KR" dirty="0"/>
+              <a:t>).</a:t>
+            </a:r>
+          </a:p>
+          <a:p>
+            <a:pPr marL="228600" marR="0" lvl="0" indent="-228600" algn="l" defTabSz="914400" rtl="0" eaLnBrk="1" fontAlgn="auto" latinLnBrk="1" hangingPunct="1">
+              <a:lnSpc>
+                <a:spcPct val="100000"/>
+              </a:lnSpc>
+              <a:spcBef>
+                <a:spcPts val="0"/>
+              </a:spcBef>
+              <a:spcAft>
+                <a:spcPts val="0"/>
+              </a:spcAft>
+              <a:buClrTx/>
+              <a:buSzTx/>
+              <a:buFontTx/>
+              <a:buAutoNum type="arabicPeriod"/>
+              <a:tabLst/>
+              <a:defRPr/>
+            </a:pPr>
+            <a:r>
+              <a:rPr lang="ko-KR" altLang="en-US" dirty="0"/>
+              <a:t>학생 정보 </a:t>
+            </a:r>
+            <a:r>
+              <a:rPr lang="en-US" altLang="ko-KR" dirty="0"/>
+              <a:t>(</a:t>
+            </a:r>
+            <a:r>
+              <a:rPr lang="ko-KR" altLang="en-US" dirty="0"/>
+              <a:t>이름</a:t>
+            </a:r>
+            <a:r>
+              <a:rPr lang="en-US" altLang="ko-KR" dirty="0"/>
+              <a:t>/</a:t>
+            </a:r>
+            <a:r>
+              <a:rPr lang="ko-KR" altLang="en-US" dirty="0"/>
+              <a:t>학번</a:t>
+            </a:r>
+            <a:r>
+              <a:rPr lang="en-US" altLang="ko-KR" dirty="0"/>
+              <a:t>) </a:t>
+            </a:r>
+            <a:r>
+              <a:rPr lang="ko-KR" altLang="en-US" dirty="0"/>
+              <a:t>표시</a:t>
+            </a:r>
+            <a:endParaRPr lang="en-US" altLang="ko-KR" dirty="0"/>
+          </a:p>
+          <a:p>
+            <a:pPr marL="228600" marR="0" lvl="0" indent="-228600" algn="l" defTabSz="914400" rtl="0" eaLnBrk="1" fontAlgn="auto" latinLnBrk="1" hangingPunct="1">
+              <a:lnSpc>
+                <a:spcPct val="100000"/>
+              </a:lnSpc>
+              <a:spcBef>
+                <a:spcPts val="0"/>
+              </a:spcBef>
+              <a:spcAft>
+                <a:spcPts val="0"/>
+              </a:spcAft>
+              <a:buClrTx/>
+              <a:buSzTx/>
+              <a:buFontTx/>
+              <a:buAutoNum type="arabicPeriod"/>
+              <a:tabLst/>
+              <a:defRPr/>
+            </a:pPr>
+            <a:r>
+              <a:rPr lang="en-US" altLang="ko-KR" dirty="0" err="1"/>
+              <a:t>TextBox</a:t>
+            </a:r>
+            <a:r>
+              <a:rPr lang="en-US" altLang="ko-KR" dirty="0"/>
+              <a:t> : </a:t>
+            </a:r>
+            <a:r>
+              <a:rPr lang="ko-KR" altLang="en-US" dirty="0"/>
+              <a:t>학생 답변 출력</a:t>
+            </a:r>
+            <a:endParaRPr lang="en-US" altLang="ko-KR" dirty="0"/>
+          </a:p>
+          <a:p>
+            <a:pPr marL="228600" marR="0" lvl="0" indent="-228600" algn="l" defTabSz="914400" rtl="0" eaLnBrk="1" fontAlgn="auto" latinLnBrk="1" hangingPunct="1">
+              <a:lnSpc>
+                <a:spcPct val="100000"/>
+              </a:lnSpc>
+              <a:spcBef>
+                <a:spcPts val="0"/>
+              </a:spcBef>
+              <a:spcAft>
+                <a:spcPts val="0"/>
+              </a:spcAft>
+              <a:buClrTx/>
+              <a:buSzTx/>
+              <a:buFontTx/>
+              <a:buAutoNum type="arabicPeriod"/>
+              <a:tabLst/>
+              <a:defRPr/>
+            </a:pPr>
+            <a:r>
+              <a:rPr lang="ko-KR" altLang="en-US" dirty="0"/>
+              <a:t>확인 버튼</a:t>
+            </a:r>
+            <a:endParaRPr lang="en-US" altLang="ko-KR" dirty="0"/>
+          </a:p>
+          <a:p>
+            <a:endParaRPr lang="en-US" altLang="ko-KR" dirty="0"/>
+          </a:p>
+        </p:txBody>
+      </p:sp>
+      <p:sp>
+        <p:nvSpPr>
+          <p:cNvPr id="4" name="슬라이드 번호 개체 틀 3"/>
+          <p:cNvSpPr>
+            <a:spLocks noGrp="1"/>
+          </p:cNvSpPr>
+          <p:nvPr>
+            <p:ph type="sldNum" sz="quarter" idx="5"/>
+          </p:nvPr>
+        </p:nvSpPr>
+        <p:spPr/>
+        <p:txBody>
+          <a:bodyPr/>
+          <a:lstStyle/>
+          <a:p>
+            <a:fld id="{76E558CC-66EE-4821-8800-2CB192EAF76D}" type="slidenum">
+              <a:rPr lang="ko-KR" altLang="en-US" smtClean="0"/>
+              <a:t>14</a:t>
             </a:fld>
             <a:endParaRPr lang="ko-KR" altLang="en-US"/>
           </a:p>
@@ -2323,53 +2559,24 @@
           <a:bodyPr/>
           <a:lstStyle/>
           <a:p>
+            <a:pPr marL="0" indent="0">
+              <a:buNone/>
+            </a:pPr>
             <a:r>
               <a:rPr lang="ko-KR" altLang="en-US" dirty="0"/>
-              <a:t>질문은 하나만</a:t>
+              <a:t>학생 </a:t>
             </a:r>
             <a:r>
               <a:rPr lang="en-US" altLang="ko-KR" dirty="0"/>
-              <a:t>,</a:t>
+              <a:t>pc</a:t>
             </a:r>
             <a:r>
               <a:rPr lang="ko-KR" altLang="en-US" dirty="0"/>
-              <a:t> 학생들을 선택해서 전송할 수 있다</a:t>
+              <a:t>화면에서 찍은 스크린샷 이미지를 확인한다</a:t>
             </a:r>
             <a:r>
               <a:rPr lang="en-US" altLang="ko-KR" dirty="0"/>
-              <a:t>.( </a:t>
-            </a:r>
-            <a:r>
-              <a:rPr lang="ko-KR" altLang="en-US" dirty="0"/>
-              <a:t>단답형</a:t>
-            </a:r>
-            <a:r>
-              <a:rPr lang="en-US" altLang="ko-KR" dirty="0"/>
-              <a:t>/</a:t>
-            </a:r>
-            <a:r>
-              <a:rPr lang="ko-KR" altLang="en-US" dirty="0"/>
-              <a:t>주관식</a:t>
-            </a:r>
-            <a:r>
-              <a:rPr lang="en-US" altLang="ko-KR" dirty="0"/>
-              <a:t>, OX</a:t>
-            </a:r>
-            <a:r>
-              <a:rPr lang="ko-KR" altLang="en-US" dirty="0"/>
-              <a:t>문제 </a:t>
-            </a:r>
-            <a:r>
-              <a:rPr lang="en-US" altLang="ko-KR" dirty="0"/>
-              <a:t>: </a:t>
-            </a:r>
-            <a:r>
-              <a:rPr lang="ko-KR" altLang="en-US" dirty="0"/>
-              <a:t>문제유형도 달라짐</a:t>
-            </a:r>
-            <a:r>
-              <a:rPr lang="en-US" altLang="ko-KR" dirty="0"/>
-              <a:t>.)</a:t>
+              <a:t>.</a:t>
             </a:r>
           </a:p>
           <a:p>
@@ -2377,16 +2584,36 @@
               <a:buAutoNum type="arabicPeriod"/>
             </a:pPr>
             <a:r>
-              <a:rPr lang="en-US" altLang="ko-KR" dirty="0" err="1"/>
-              <a:t>TextBox</a:t>
-            </a:r>
-            <a:r>
               <a:rPr lang="en-US" altLang="ko-KR" dirty="0"/>
-              <a:t> :</a:t>
+              <a:t>Label : </a:t>
             </a:r>
             <a:r>
               <a:rPr lang="ko-KR" altLang="en-US" dirty="0"/>
-              <a:t> 교수님의 질문 작성</a:t>
+              <a:t>학생 정보 </a:t>
+            </a:r>
+            <a:r>
+              <a:rPr lang="en-US" altLang="ko-KR" dirty="0"/>
+              <a:t>(</a:t>
+            </a:r>
+            <a:r>
+              <a:rPr lang="ko-KR" altLang="en-US" dirty="0"/>
+              <a:t>이름</a:t>
+            </a:r>
+            <a:r>
+              <a:rPr lang="en-US" altLang="ko-KR" dirty="0"/>
+              <a:t>/</a:t>
+            </a:r>
+            <a:r>
+              <a:rPr lang="ko-KR" altLang="en-US" dirty="0"/>
+              <a:t>학번</a:t>
+            </a:r>
+            <a:r>
+              <a:rPr lang="en-US" altLang="ko-KR" dirty="0"/>
+              <a:t>) </a:t>
+            </a:r>
+            <a:r>
+              <a:rPr lang="ko-KR" altLang="en-US" dirty="0"/>
+              <a:t>과 촬영시간 표시</a:t>
             </a:r>
             <a:endParaRPr lang="en-US" altLang="ko-KR" dirty="0"/>
           </a:p>
@@ -2396,7 +2623,7 @@
             </a:pPr>
             <a:r>
               <a:rPr lang="en-US" altLang="ko-KR" dirty="0" err="1"/>
-              <a:t>RadioButton</a:t>
+              <a:t>PictureBox</a:t>
             </a:r>
             <a:r>
               <a:rPr lang="en-US" altLang="ko-KR" dirty="0"/>
@@ -2404,77 +2631,23 @@
             </a:r>
             <a:r>
               <a:rPr lang="ko-KR" altLang="en-US" dirty="0"/>
-              <a:t>질문 타입 </a:t>
-            </a:r>
-            <a:r>
-              <a:rPr lang="en-US" altLang="ko-KR" dirty="0"/>
-              <a:t>–</a:t>
-            </a:r>
-            <a:r>
-              <a:rPr lang="ko-KR" altLang="en-US" dirty="0"/>
-              <a:t>학생입력과</a:t>
-            </a:r>
-            <a:r>
-              <a:rPr lang="en-US" altLang="ko-KR" dirty="0"/>
-              <a:t> O/X </a:t>
-            </a:r>
-            <a:r>
-              <a:rPr lang="ko-KR" altLang="en-US" dirty="0"/>
-              <a:t>중 선택</a:t>
-            </a:r>
-            <a:r>
-              <a:rPr lang="en-US" altLang="ko-KR" dirty="0"/>
-              <a:t>1</a:t>
-            </a:r>
+              <a:t>학생의 스크린샷 이미지</a:t>
+            </a:r>
+            <a:endParaRPr lang="en-US" altLang="ko-KR" dirty="0"/>
           </a:p>
           <a:p>
             <a:pPr marL="228600" indent="-228600">
               <a:buAutoNum type="arabicPeriod"/>
             </a:pPr>
             <a:r>
-              <a:rPr lang="en-US" altLang="ko-KR" dirty="0" err="1"/>
-              <a:t>GridView</a:t>
-            </a:r>
-            <a:r>
-              <a:rPr lang="en-US" altLang="ko-KR" dirty="0"/>
-              <a:t> : </a:t>
+              <a:rPr lang="ko-KR" altLang="en-US"/>
+              <a:t>확인 </a:t>
             </a:r>
             <a:r>
               <a:rPr lang="ko-KR" altLang="en-US" dirty="0"/>
-              <a:t>전송할 학생 선택</a:t>
+              <a:t>버튼</a:t>
             </a:r>
             <a:endParaRPr lang="en-US" altLang="ko-KR" dirty="0"/>
-          </a:p>
-          <a:p>
-            <a:pPr marL="228600" indent="-228600">
-              <a:buAutoNum type="arabicPeriod"/>
-            </a:pPr>
-            <a:r>
-              <a:rPr lang="en-US" altLang="ko-KR" dirty="0"/>
-              <a:t>Button : </a:t>
-            </a:r>
-            <a:r>
-              <a:rPr lang="ko-KR" altLang="en-US" dirty="0"/>
-              <a:t>전체 선택</a:t>
-            </a:r>
-            <a:r>
-              <a:rPr lang="en-US" altLang="ko-KR" dirty="0"/>
-              <a:t>/</a:t>
-            </a:r>
-            <a:r>
-              <a:rPr lang="ko-KR" altLang="en-US" dirty="0"/>
-              <a:t>전체 취소</a:t>
-            </a:r>
-            <a:endParaRPr lang="en-US" altLang="ko-KR" dirty="0"/>
-          </a:p>
-          <a:p>
-            <a:pPr marL="228600" indent="-228600">
-              <a:buAutoNum type="arabicPeriod"/>
-            </a:pPr>
-            <a:r>
-              <a:rPr lang="ko-KR" altLang="en-US" dirty="0"/>
-              <a:t>전송 및 취소</a:t>
-            </a:r>
           </a:p>
         </p:txBody>
       </p:sp>
@@ -2504,7 +2677,7 @@
     </p:spTree>
     <p:extLst>
       <p:ext uri="{BB962C8B-B14F-4D97-AF65-F5344CB8AC3E}">
-        <p14:creationId xmlns:p14="http://schemas.microsoft.com/office/powerpoint/2010/main" val="3716798818"/>
+        <p14:creationId xmlns:p14="http://schemas.microsoft.com/office/powerpoint/2010/main" val="2066793731"/>
       </p:ext>
     </p:extLst>
   </p:cSld>
@@ -2693,7 +2866,7 @@
           <a:p>
             <a:fld id="{F8166F1F-CE9B-4651-A6AA-CD717754106B}" type="datetimeFigureOut">
               <a:rPr lang="en-US" smtClean="0"/>
-              <a:t>9/29/2021</a:t>
+              <a:t>9/30/2021</a:t>
             </a:fld>
             <a:endParaRPr lang="en-US"/>
           </a:p>
@@ -2856,7 +3029,7 @@
           <a:p>
             <a:fld id="{A76116CE-C4A3-4A05-B2D7-7C2E9A889C0F}" type="datetimeFigureOut">
               <a:rPr lang="en-US" smtClean="0"/>
-              <a:t>9/29/2021</a:t>
+              <a:t>9/30/2021</a:t>
             </a:fld>
             <a:endParaRPr lang="en-US"/>
           </a:p>
@@ -3029,7 +3202,7 @@
           <a:p>
             <a:fld id="{A76116CE-C4A3-4A05-B2D7-7C2E9A889C0F}" type="datetimeFigureOut">
               <a:rPr lang="en-US" smtClean="0"/>
-              <a:t>9/29/2021</a:t>
+              <a:t>9/30/2021</a:t>
             </a:fld>
             <a:endParaRPr lang="en-US"/>
           </a:p>
@@ -3194,7 +3367,7 @@
           <a:p>
             <a:fld id="{A76116CE-C4A3-4A05-B2D7-7C2E9A889C0F}" type="datetimeFigureOut">
               <a:rPr lang="en-US" smtClean="0"/>
-              <a:t>9/29/2021</a:t>
+              <a:t>9/30/2021</a:t>
             </a:fld>
             <a:endParaRPr lang="en-US"/>
           </a:p>
@@ -3434,7 +3607,7 @@
           <a:p>
             <a:fld id="{A76116CE-C4A3-4A05-B2D7-7C2E9A889C0F}" type="datetimeFigureOut">
               <a:rPr lang="en-US" smtClean="0"/>
-              <a:t>9/29/2021</a:t>
+              <a:t>9/30/2021</a:t>
             </a:fld>
             <a:endParaRPr lang="en-US"/>
           </a:p>
@@ -3714,7 +3887,7 @@
           <a:p>
             <a:fld id="{A76116CE-C4A3-4A05-B2D7-7C2E9A889C0F}" type="datetimeFigureOut">
               <a:rPr lang="en-US" smtClean="0"/>
-              <a:t>9/29/2021</a:t>
+              <a:t>9/30/2021</a:t>
             </a:fld>
             <a:endParaRPr lang="en-US"/>
           </a:p>
@@ -4128,7 +4301,7 @@
           <a:p>
             <a:fld id="{A76116CE-C4A3-4A05-B2D7-7C2E9A889C0F}" type="datetimeFigureOut">
               <a:rPr lang="en-US" smtClean="0"/>
-              <a:t>9/29/2021</a:t>
+              <a:t>9/30/2021</a:t>
             </a:fld>
             <a:endParaRPr lang="en-US"/>
           </a:p>
@@ -4240,7 +4413,7 @@
           <a:p>
             <a:fld id="{A76116CE-C4A3-4A05-B2D7-7C2E9A889C0F}" type="datetimeFigureOut">
               <a:rPr lang="en-US" smtClean="0"/>
-              <a:t>9/29/2021</a:t>
+              <a:t>9/30/2021</a:t>
             </a:fld>
             <a:endParaRPr lang="en-US"/>
           </a:p>
@@ -4330,7 +4503,7 @@
           <a:p>
             <a:fld id="{A76116CE-C4A3-4A05-B2D7-7C2E9A889C0F}" type="datetimeFigureOut">
               <a:rPr lang="en-US" smtClean="0"/>
-              <a:t>9/29/2021</a:t>
+              <a:t>9/30/2021</a:t>
             </a:fld>
             <a:endParaRPr lang="en-US"/>
           </a:p>
@@ -4600,7 +4773,7 @@
           <a:p>
             <a:fld id="{A76116CE-C4A3-4A05-B2D7-7C2E9A889C0F}" type="datetimeFigureOut">
               <a:rPr lang="en-US" smtClean="0"/>
-              <a:t>9/29/2021</a:t>
+              <a:t>9/30/2021</a:t>
             </a:fld>
             <a:endParaRPr lang="en-US"/>
           </a:p>
@@ -4847,7 +5020,7 @@
           <a:p>
             <a:fld id="{A76116CE-C4A3-4A05-B2D7-7C2E9A889C0F}" type="datetimeFigureOut">
               <a:rPr lang="en-US" smtClean="0"/>
-              <a:t>9/29/2021</a:t>
+              <a:t>9/30/2021</a:t>
             </a:fld>
             <a:endParaRPr lang="en-US"/>
           </a:p>
@@ -5053,7 +5226,7 @@
           <a:p>
             <a:fld id="{F8166F1F-CE9B-4651-A6AA-CD717754106B}" type="datetimeFigureOut">
               <a:rPr lang="en-US" smtClean="0"/>
-              <a:t>9/29/2021</a:t>
+              <a:t>9/30/2021</a:t>
             </a:fld>
             <a:endParaRPr lang="en-US"/>
           </a:p>
@@ -5768,12 +5941,636 @@
           <a:chExt cx="0" cy="0"/>
         </a:xfrm>
       </p:grpSpPr>
+      <p:grpSp>
+        <p:nvGrpSpPr>
+          <p:cNvPr id="1002" name="그룹 1002"/>
+          <p:cNvGrpSpPr/>
+          <p:nvPr/>
+        </p:nvGrpSpPr>
+        <p:grpSpPr>
+          <a:xfrm>
+            <a:off x="52948" y="382241"/>
+            <a:ext cx="17829405" cy="543736"/>
+            <a:chOff x="52948" y="382241"/>
+            <a:chExt cx="17829405" cy="543736"/>
+          </a:xfrm>
+        </p:grpSpPr>
+        <p:grpSp>
+          <p:nvGrpSpPr>
+            <p:cNvPr id="1003" name="그룹 1003"/>
+            <p:cNvGrpSpPr/>
+            <p:nvPr/>
+          </p:nvGrpSpPr>
+          <p:grpSpPr>
+            <a:xfrm>
+              <a:off x="274670" y="382241"/>
+              <a:ext cx="17607683" cy="81659"/>
+              <a:chOff x="274670" y="382241"/>
+              <a:chExt cx="17607683" cy="81659"/>
+            </a:xfrm>
+          </p:grpSpPr>
+          <p:pic>
+            <p:nvPicPr>
+              <p:cNvPr id="8" name="Object 7"/>
+              <p:cNvPicPr>
+                <a:picLocks noChangeAspect="1"/>
+              </p:cNvPicPr>
+              <p:nvPr/>
+            </p:nvPicPr>
+            <p:blipFill>
+              <a:blip r:embed="rId3" cstate="print"/>
+              <a:stretch>
+                <a:fillRect/>
+              </a:stretch>
+            </p:blipFill>
+            <p:spPr>
+              <a:xfrm>
+                <a:off x="274670" y="382241"/>
+                <a:ext cx="17607683" cy="81659"/>
+              </a:xfrm>
+              <a:prstGeom prst="rect">
+                <a:avLst/>
+              </a:prstGeom>
+            </p:spPr>
+          </p:pic>
+        </p:grpSp>
+        <p:grpSp>
+          <p:nvGrpSpPr>
+            <p:cNvPr id="1004" name="그룹 1004"/>
+            <p:cNvGrpSpPr/>
+            <p:nvPr/>
+          </p:nvGrpSpPr>
+          <p:grpSpPr>
+            <a:xfrm>
+              <a:off x="274670" y="823218"/>
+              <a:ext cx="17607683" cy="81659"/>
+              <a:chOff x="274670" y="823218"/>
+              <a:chExt cx="17607683" cy="81659"/>
+            </a:xfrm>
+          </p:grpSpPr>
+          <p:pic>
+            <p:nvPicPr>
+              <p:cNvPr id="11" name="Object 10"/>
+              <p:cNvPicPr>
+                <a:picLocks noChangeAspect="1"/>
+              </p:cNvPicPr>
+              <p:nvPr/>
+            </p:nvPicPr>
+            <p:blipFill>
+              <a:blip r:embed="rId3" cstate="print"/>
+              <a:stretch>
+                <a:fillRect/>
+              </a:stretch>
+            </p:blipFill>
+            <p:spPr>
+              <a:xfrm>
+                <a:off x="274670" y="823218"/>
+                <a:ext cx="17607683" cy="81659"/>
+              </a:xfrm>
+              <a:prstGeom prst="rect">
+                <a:avLst/>
+              </a:prstGeom>
+            </p:spPr>
+          </p:pic>
+        </p:grpSp>
+        <p:sp>
+          <p:nvSpPr>
+            <p:cNvPr id="16" name="Object 16"/>
+            <p:cNvSpPr txBox="1"/>
+            <p:nvPr/>
+          </p:nvSpPr>
+          <p:spPr>
+            <a:xfrm>
+              <a:off x="52948" y="510416"/>
+              <a:ext cx="4664853" cy="415561"/>
+            </a:xfrm>
+            <a:prstGeom prst="rect">
+              <a:avLst/>
+            </a:prstGeom>
+            <a:noFill/>
+          </p:spPr>
+          <p:txBody>
+            <a:bodyPr wrap="square" rtlCol="0"/>
+            <a:lstStyle/>
+            <a:p>
+              <a:pPr algn="ctr"/>
+              <a:r>
+                <a:rPr lang="ko-KR" altLang="en-US" sz="1500" kern="0" spc="-100" dirty="0">
+                  <a:solidFill>
+                    <a:srgbClr val="000000"/>
+                  </a:solidFill>
+                  <a:latin typeface="S-Core Dream 4 Regular" pitchFamily="34" charset="0"/>
+                </a:rPr>
+                <a:t>교수 폼 구성</a:t>
+              </a:r>
+              <a:endParaRPr lang="en-US" dirty="0"/>
+            </a:p>
+          </p:txBody>
+        </p:sp>
+      </p:grpSp>
+      <p:grpSp>
+        <p:nvGrpSpPr>
+          <p:cNvPr id="17" name="그룹 16">
+            <a:extLst>
+              <a:ext uri="{FF2B5EF4-FFF2-40B4-BE49-F238E27FC236}">
+                <a16:creationId xmlns:a16="http://schemas.microsoft.com/office/drawing/2014/main" id="{E4ADFF60-5A3D-486C-ADBA-C2D3522507FE}"/>
+              </a:ext>
+            </a:extLst>
+          </p:cNvPr>
+          <p:cNvGrpSpPr/>
+          <p:nvPr/>
+        </p:nvGrpSpPr>
+        <p:grpSpPr>
+          <a:xfrm>
+            <a:off x="3797341" y="1171345"/>
+            <a:ext cx="10693319" cy="1580565"/>
+            <a:chOff x="3251281" y="1171345"/>
+            <a:chExt cx="10693319" cy="1580565"/>
+          </a:xfrm>
+        </p:grpSpPr>
+        <p:sp>
+          <p:nvSpPr>
+            <p:cNvPr id="2" name="Object 2"/>
+            <p:cNvSpPr txBox="1"/>
+            <p:nvPr/>
+          </p:nvSpPr>
+          <p:spPr>
+            <a:xfrm>
+              <a:off x="4876800" y="1633799"/>
+              <a:ext cx="9067800" cy="655656"/>
+            </a:xfrm>
+            <a:prstGeom prst="rect">
+              <a:avLst/>
+            </a:prstGeom>
+            <a:noFill/>
+          </p:spPr>
+          <p:txBody>
+            <a:bodyPr wrap="square" rtlCol="0"/>
+            <a:lstStyle/>
+            <a:p>
+              <a:pPr algn="just"/>
+              <a:r>
+                <a:rPr lang="ko-KR" altLang="en-US" sz="3200" dirty="0">
+                  <a:latin typeface="맑은 고딕" panose="020B0503020000020004" pitchFamily="50" charset="-127"/>
+                  <a:ea typeface="맑은 고딕" panose="020B0503020000020004" pitchFamily="50" charset="-127"/>
+                </a:rPr>
+                <a:t>교수 </a:t>
+              </a:r>
+              <a:r>
+                <a:rPr lang="ko" altLang="ko-KR" sz="3200" dirty="0">
+                  <a:latin typeface="맑은 고딕" panose="020B0503020000020004" pitchFamily="50" charset="-127"/>
+                  <a:ea typeface="맑은 고딕" panose="020B0503020000020004" pitchFamily="50" charset="-127"/>
+                </a:rPr>
+                <a:t>스크린샷(ScreenshotForm)</a:t>
+              </a:r>
+              <a:r>
+                <a:rPr lang="ko-KR" altLang="en-US" sz="3200" dirty="0">
+                  <a:latin typeface="맑은 고딕" panose="020B0503020000020004" pitchFamily="50" charset="-127"/>
+                  <a:ea typeface="맑은 고딕" panose="020B0503020000020004" pitchFamily="50" charset="-127"/>
+                </a:rPr>
+                <a:t> 레이아웃 구성</a:t>
+              </a:r>
+              <a:endParaRPr lang="en-US" altLang="ko-KR" sz="3200" dirty="0">
+                <a:latin typeface="맑은 고딕" panose="020B0503020000020004" pitchFamily="50" charset="-127"/>
+                <a:ea typeface="맑은 고딕" panose="020B0503020000020004" pitchFamily="50" charset="-127"/>
+              </a:endParaRPr>
+            </a:p>
+            <a:p>
+              <a:pPr algn="just"/>
+              <a:endParaRPr lang="en-US" dirty="0">
+                <a:latin typeface="맑은 고딕" panose="020B0503020000020004" pitchFamily="50" charset="-127"/>
+                <a:ea typeface="맑은 고딕" panose="020B0503020000020004" pitchFamily="50" charset="-127"/>
+              </a:endParaRPr>
+            </a:p>
+          </p:txBody>
+        </p:sp>
+        <p:sp>
+          <p:nvSpPr>
+            <p:cNvPr id="23" name="Object 3">
+              <a:extLst>
+                <a:ext uri="{FF2B5EF4-FFF2-40B4-BE49-F238E27FC236}">
+                  <a16:creationId xmlns:a16="http://schemas.microsoft.com/office/drawing/2014/main" id="{97A89B99-15C8-405B-A20E-05D13B283A03}"/>
+                </a:ext>
+              </a:extLst>
+            </p:cNvPr>
+            <p:cNvSpPr txBox="1"/>
+            <p:nvPr/>
+          </p:nvSpPr>
+          <p:spPr>
+            <a:xfrm>
+              <a:off x="3251281" y="1171345"/>
+              <a:ext cx="1625519" cy="1580565"/>
+            </a:xfrm>
+            <a:prstGeom prst="rect">
+              <a:avLst/>
+            </a:prstGeom>
+            <a:noFill/>
+          </p:spPr>
+          <p:txBody>
+            <a:bodyPr wrap="square" rtlCol="0"/>
+            <a:lstStyle/>
+            <a:p>
+              <a:pPr algn="just"/>
+              <a:r>
+                <a:rPr lang="en-US" sz="9600" kern="0" spc="-200" dirty="0">
+                  <a:solidFill>
+                    <a:srgbClr val="7FA2C4"/>
+                  </a:solidFill>
+                  <a:latin typeface="맑은 고딕" panose="020B0503020000020004" pitchFamily="50" charset="-127"/>
+                  <a:ea typeface="맑은 고딕" panose="020B0503020000020004" pitchFamily="50" charset="-127"/>
+                  <a:cs typeface="Black Han Sans" pitchFamily="34" charset="0"/>
+                </a:rPr>
+                <a:t>06</a:t>
+              </a:r>
+              <a:endParaRPr lang="en-US" sz="9600" dirty="0">
+                <a:latin typeface="맑은 고딕" panose="020B0503020000020004" pitchFamily="50" charset="-127"/>
+                <a:ea typeface="맑은 고딕" panose="020B0503020000020004" pitchFamily="50" charset="-127"/>
+              </a:endParaRPr>
+            </a:p>
+          </p:txBody>
+        </p:sp>
+      </p:grpSp>
+      <p:grpSp>
+        <p:nvGrpSpPr>
+          <p:cNvPr id="15" name="그룹 14">
+            <a:extLst>
+              <a:ext uri="{FF2B5EF4-FFF2-40B4-BE49-F238E27FC236}">
+                <a16:creationId xmlns:a16="http://schemas.microsoft.com/office/drawing/2014/main" id="{E737C819-D045-42A0-965D-975442A7D88C}"/>
+              </a:ext>
+            </a:extLst>
+          </p:cNvPr>
+          <p:cNvGrpSpPr/>
+          <p:nvPr/>
+        </p:nvGrpSpPr>
+        <p:grpSpPr>
+          <a:xfrm>
+            <a:off x="2145040" y="2635106"/>
+            <a:ext cx="13997920" cy="7374122"/>
+            <a:chOff x="1174333" y="2781300"/>
+            <a:chExt cx="13997920" cy="7374122"/>
+          </a:xfrm>
+        </p:grpSpPr>
+        <p:pic>
+          <p:nvPicPr>
+            <p:cNvPr id="13" name="그림 12">
+              <a:extLst>
+                <a:ext uri="{FF2B5EF4-FFF2-40B4-BE49-F238E27FC236}">
+                  <a16:creationId xmlns:a16="http://schemas.microsoft.com/office/drawing/2014/main" id="{E615590B-267A-469A-9E6D-7844B9E2B582}"/>
+                </a:ext>
+              </a:extLst>
+            </p:cNvPr>
+            <p:cNvPicPr>
+              <a:picLocks noChangeAspect="1"/>
+            </p:cNvPicPr>
+            <p:nvPr/>
+          </p:nvPicPr>
+          <p:blipFill>
+            <a:blip r:embed="rId4"/>
+            <a:stretch>
+              <a:fillRect/>
+            </a:stretch>
+          </p:blipFill>
+          <p:spPr>
+            <a:xfrm>
+              <a:off x="2057400" y="2781300"/>
+              <a:ext cx="13114853" cy="6891799"/>
+            </a:xfrm>
+            <a:prstGeom prst="rect">
+              <a:avLst/>
+            </a:prstGeom>
+          </p:spPr>
+        </p:pic>
+        <p:sp>
+          <p:nvSpPr>
+            <p:cNvPr id="32" name="Google Shape;83;p14">
+              <a:extLst>
+                <a:ext uri="{FF2B5EF4-FFF2-40B4-BE49-F238E27FC236}">
+                  <a16:creationId xmlns:a16="http://schemas.microsoft.com/office/drawing/2014/main" id="{B0CA695A-2CDC-4167-B471-BC38A077B08B}"/>
+                </a:ext>
+              </a:extLst>
+            </p:cNvPr>
+            <p:cNvSpPr txBox="1"/>
+            <p:nvPr/>
+          </p:nvSpPr>
+          <p:spPr>
+            <a:xfrm>
+              <a:off x="1174333" y="5858943"/>
+              <a:ext cx="1917646" cy="615523"/>
+            </a:xfrm>
+            <a:prstGeom prst="rect">
+              <a:avLst/>
+            </a:prstGeom>
+            <a:solidFill>
+              <a:schemeClr val="bg1"/>
+            </a:solidFill>
+            <a:ln>
+              <a:noFill/>
+            </a:ln>
+          </p:spPr>
+          <p:txBody>
+            <a:bodyPr spcFirstLastPara="1" wrap="square" lIns="91425" tIns="91425" rIns="91425" bIns="91425" anchor="t" anchorCtr="0">
+              <a:spAutoFit/>
+            </a:bodyPr>
+            <a:lstStyle/>
+            <a:p>
+              <a:pPr marL="0" lvl="0" indent="0" algn="l" rtl="0">
+                <a:spcBef>
+                  <a:spcPts val="0"/>
+                </a:spcBef>
+                <a:spcAft>
+                  <a:spcPts val="0"/>
+                </a:spcAft>
+                <a:buNone/>
+              </a:pPr>
+              <a:r>
+                <a:rPr lang="ko" sz="2800" b="1" dirty="0"/>
+                <a:t>PictureBox</a:t>
+              </a:r>
+              <a:endParaRPr sz="2800" b="1" dirty="0"/>
+            </a:p>
+          </p:txBody>
+        </p:sp>
+        <p:sp>
+          <p:nvSpPr>
+            <p:cNvPr id="3" name="직사각형 2">
+              <a:extLst>
+                <a:ext uri="{FF2B5EF4-FFF2-40B4-BE49-F238E27FC236}">
+                  <a16:creationId xmlns:a16="http://schemas.microsoft.com/office/drawing/2014/main" id="{85432E8F-4924-4348-B78B-2A4BDA75334B}"/>
+                </a:ext>
+              </a:extLst>
+            </p:cNvPr>
+            <p:cNvSpPr/>
+            <p:nvPr/>
+          </p:nvSpPr>
+          <p:spPr>
+            <a:xfrm>
+              <a:off x="2209800" y="3660226"/>
+              <a:ext cx="8153400" cy="322294"/>
+            </a:xfrm>
+            <a:prstGeom prst="rect">
+              <a:avLst/>
+            </a:prstGeom>
+            <a:noFill/>
+            <a:ln>
+              <a:solidFill>
+                <a:srgbClr val="7030A0"/>
+              </a:solidFill>
+            </a:ln>
+          </p:spPr>
+          <p:style>
+            <a:lnRef idx="2">
+              <a:schemeClr val="accent1">
+                <a:shade val="50000"/>
+              </a:schemeClr>
+            </a:lnRef>
+            <a:fillRef idx="1">
+              <a:schemeClr val="accent1"/>
+            </a:fillRef>
+            <a:effectRef idx="0">
+              <a:schemeClr val="accent1"/>
+            </a:effectRef>
+            <a:fontRef idx="minor">
+              <a:schemeClr val="lt1"/>
+            </a:fontRef>
+          </p:style>
+          <p:txBody>
+            <a:bodyPr rtlCol="0" anchor="ctr"/>
+            <a:lstStyle/>
+            <a:p>
+              <a:pPr algn="ctr"/>
+              <a:endParaRPr lang="ko-KR" altLang="en-US">
+                <a:latin typeface="맑은 고딕" panose="020B0503020000020004" pitchFamily="50" charset="-127"/>
+                <a:ea typeface="맑은 고딕" panose="020B0503020000020004" pitchFamily="50" charset="-127"/>
+              </a:endParaRPr>
+            </a:p>
+          </p:txBody>
+        </p:sp>
+        <p:sp>
+          <p:nvSpPr>
+            <p:cNvPr id="26" name="Google Shape;85;p14">
+              <a:extLst>
+                <a:ext uri="{FF2B5EF4-FFF2-40B4-BE49-F238E27FC236}">
+                  <a16:creationId xmlns:a16="http://schemas.microsoft.com/office/drawing/2014/main" id="{3C784F2F-4838-40CF-B24B-E55841C2FB6C}"/>
+                </a:ext>
+              </a:extLst>
+            </p:cNvPr>
+            <p:cNvSpPr txBox="1"/>
+            <p:nvPr/>
+          </p:nvSpPr>
+          <p:spPr>
+            <a:xfrm>
+              <a:off x="10604104" y="3137021"/>
+              <a:ext cx="4026296" cy="1046410"/>
+            </a:xfrm>
+            <a:prstGeom prst="rect">
+              <a:avLst/>
+            </a:prstGeom>
+            <a:noFill/>
+            <a:ln>
+              <a:noFill/>
+            </a:ln>
+          </p:spPr>
+          <p:txBody>
+            <a:bodyPr spcFirstLastPara="1" wrap="square" lIns="91425" tIns="91425" rIns="91425" bIns="91425" anchor="t" anchorCtr="0">
+              <a:spAutoFit/>
+            </a:bodyPr>
+            <a:lstStyle/>
+            <a:p>
+              <a:pPr marL="0" lvl="0" indent="0" algn="l" rtl="0">
+                <a:spcBef>
+                  <a:spcPts val="0"/>
+                </a:spcBef>
+                <a:spcAft>
+                  <a:spcPts val="0"/>
+                </a:spcAft>
+                <a:buNone/>
+              </a:pPr>
+              <a:r>
+                <a:rPr lang="ko" sz="2800" b="1" dirty="0">
+                  <a:latin typeface="맑은 고딕" panose="020B0503020000020004" pitchFamily="50" charset="-127"/>
+                  <a:ea typeface="맑은 고딕" panose="020B0503020000020004" pitchFamily="50" charset="-127"/>
+                </a:rPr>
+                <a:t>Label </a:t>
+              </a:r>
+              <a:endParaRPr lang="en-US" altLang="ko" sz="2800" b="1" dirty="0">
+                <a:latin typeface="맑은 고딕" panose="020B0503020000020004" pitchFamily="50" charset="-127"/>
+                <a:ea typeface="맑은 고딕" panose="020B0503020000020004" pitchFamily="50" charset="-127"/>
+              </a:endParaRPr>
+            </a:p>
+            <a:p>
+              <a:pPr marL="0" lvl="0" indent="0" algn="l" rtl="0">
+                <a:spcBef>
+                  <a:spcPts val="0"/>
+                </a:spcBef>
+                <a:spcAft>
+                  <a:spcPts val="0"/>
+                </a:spcAft>
+                <a:buNone/>
+              </a:pPr>
+              <a:r>
+                <a:rPr lang="en-US" altLang="ko" sz="2800" b="1" dirty="0">
+                  <a:latin typeface="맑은 고딕" panose="020B0503020000020004" pitchFamily="50" charset="-127"/>
+                  <a:ea typeface="맑은 고딕" panose="020B0503020000020004" pitchFamily="50" charset="-127"/>
+                </a:rPr>
+                <a:t>– </a:t>
+              </a:r>
+              <a:r>
+                <a:rPr lang="ko-KR" altLang="en-US" sz="2800" b="1" dirty="0">
+                  <a:latin typeface="맑은 고딕" panose="020B0503020000020004" pitchFamily="50" charset="-127"/>
+                  <a:ea typeface="맑은 고딕" panose="020B0503020000020004" pitchFamily="50" charset="-127"/>
+                </a:rPr>
+                <a:t>학생 정보</a:t>
+              </a:r>
+              <a:r>
+                <a:rPr lang="en-US" altLang="ko-KR" sz="2800" b="1" dirty="0">
+                  <a:latin typeface="맑은 고딕" panose="020B0503020000020004" pitchFamily="50" charset="-127"/>
+                  <a:ea typeface="맑은 고딕" panose="020B0503020000020004" pitchFamily="50" charset="-127"/>
+                </a:rPr>
+                <a:t>/ </a:t>
+              </a:r>
+              <a:r>
+                <a:rPr lang="ko-KR" altLang="en-US" sz="2800" b="1" dirty="0">
+                  <a:latin typeface="맑은 고딕" panose="020B0503020000020004" pitchFamily="50" charset="-127"/>
+                  <a:ea typeface="맑은 고딕" panose="020B0503020000020004" pitchFamily="50" charset="-127"/>
+                </a:rPr>
+                <a:t>촬영시간</a:t>
+              </a:r>
+              <a:endParaRPr sz="2800" b="1" dirty="0">
+                <a:latin typeface="맑은 고딕" panose="020B0503020000020004" pitchFamily="50" charset="-127"/>
+                <a:ea typeface="맑은 고딕" panose="020B0503020000020004" pitchFamily="50" charset="-127"/>
+              </a:endParaRPr>
+            </a:p>
+          </p:txBody>
+        </p:sp>
+        <p:sp>
+          <p:nvSpPr>
+            <p:cNvPr id="37" name="Google Shape;85;p14">
+              <a:extLst>
+                <a:ext uri="{FF2B5EF4-FFF2-40B4-BE49-F238E27FC236}">
+                  <a16:creationId xmlns:a16="http://schemas.microsoft.com/office/drawing/2014/main" id="{C0769CCB-B352-4FE6-8BC3-64A3C73981FD}"/>
+                </a:ext>
+              </a:extLst>
+            </p:cNvPr>
+            <p:cNvSpPr txBox="1"/>
+            <p:nvPr/>
+          </p:nvSpPr>
+          <p:spPr>
+            <a:xfrm>
+              <a:off x="7467600" y="9539899"/>
+              <a:ext cx="2656063" cy="615523"/>
+            </a:xfrm>
+            <a:prstGeom prst="rect">
+              <a:avLst/>
+            </a:prstGeom>
+            <a:solidFill>
+              <a:schemeClr val="bg1"/>
+            </a:solidFill>
+            <a:ln>
+              <a:noFill/>
+            </a:ln>
+          </p:spPr>
+          <p:txBody>
+            <a:bodyPr spcFirstLastPara="1" wrap="square" lIns="91425" tIns="91425" rIns="91425" bIns="91425" anchor="t" anchorCtr="0">
+              <a:spAutoFit/>
+            </a:bodyPr>
+            <a:lstStyle/>
+            <a:p>
+              <a:pPr marL="0" lvl="0" indent="0" algn="l" rtl="0">
+                <a:spcBef>
+                  <a:spcPts val="0"/>
+                </a:spcBef>
+                <a:spcAft>
+                  <a:spcPts val="0"/>
+                </a:spcAft>
+                <a:buNone/>
+              </a:pPr>
+              <a:r>
+                <a:rPr lang="en-US" altLang="ko" sz="2800" b="1" dirty="0">
+                  <a:latin typeface="맑은 고딕" panose="020B0503020000020004" pitchFamily="50" charset="-127"/>
+                  <a:ea typeface="맑은 고딕" panose="020B0503020000020004" pitchFamily="50" charset="-127"/>
+                </a:rPr>
+                <a:t>Button</a:t>
+              </a:r>
+              <a:r>
+                <a:rPr lang="ko" sz="2800" b="1" dirty="0">
+                  <a:latin typeface="맑은 고딕" panose="020B0503020000020004" pitchFamily="50" charset="-127"/>
+                  <a:ea typeface="맑은 고딕" panose="020B0503020000020004" pitchFamily="50" charset="-127"/>
+                </a:rPr>
+                <a:t> </a:t>
+              </a:r>
+              <a:r>
+                <a:rPr lang="en-US" altLang="ko" sz="2800" b="1" dirty="0">
+                  <a:latin typeface="맑은 고딕" panose="020B0503020000020004" pitchFamily="50" charset="-127"/>
+                  <a:ea typeface="맑은 고딕" panose="020B0503020000020004" pitchFamily="50" charset="-127"/>
+                </a:rPr>
+                <a:t>(</a:t>
+              </a:r>
+              <a:r>
+                <a:rPr lang="ko-KR" altLang="en-US" sz="2800" b="1" dirty="0">
+                  <a:latin typeface="맑은 고딕" panose="020B0503020000020004" pitchFamily="50" charset="-127"/>
+                  <a:ea typeface="맑은 고딕" panose="020B0503020000020004" pitchFamily="50" charset="-127"/>
+                </a:rPr>
+                <a:t>닫기</a:t>
+              </a:r>
+              <a:r>
+                <a:rPr lang="en-US" altLang="ko-KR" sz="2800" b="1" dirty="0">
+                  <a:latin typeface="맑은 고딕" panose="020B0503020000020004" pitchFamily="50" charset="-127"/>
+                  <a:ea typeface="맑은 고딕" panose="020B0503020000020004" pitchFamily="50" charset="-127"/>
+                </a:rPr>
+                <a:t>)</a:t>
+              </a:r>
+              <a:endParaRPr sz="2800" b="1" dirty="0">
+                <a:latin typeface="맑은 고딕" panose="020B0503020000020004" pitchFamily="50" charset="-127"/>
+                <a:ea typeface="맑은 고딕" panose="020B0503020000020004" pitchFamily="50" charset="-127"/>
+              </a:endParaRPr>
+            </a:p>
+          </p:txBody>
+        </p:sp>
+      </p:grpSp>
+    </p:spTree>
+    <p:extLst>
+      <p:ext uri="{BB962C8B-B14F-4D97-AF65-F5344CB8AC3E}">
+        <p14:creationId xmlns:p14="http://schemas.microsoft.com/office/powerpoint/2010/main" val="2569205514"/>
+      </p:ext>
+    </p:extLst>
+  </p:cSld>
+  <p:clrMapOvr>
+    <a:masterClrMapping/>
+  </p:clrMapOvr>
+</p:sld>
+</file>
+
+<file path=ppt/slides/slide11.xml><?xml version="1.0" encoding="utf-8"?>
+<p:sld xmlns:a="http://schemas.openxmlformats.org/drawingml/2006/main" xmlns:r="http://schemas.openxmlformats.org/officeDocument/2006/relationships" xmlns:p="http://schemas.openxmlformats.org/presentationml/2006/main">
+  <p:cSld>
+    <p:bg>
+      <p:bgPr>
+        <a:solidFill>
+          <a:srgbClr val="E1DEDB"/>
+        </a:solidFill>
+        <a:effectLst/>
+      </p:bgPr>
+    </p:bg>
+    <p:spTree>
+      <p:nvGrpSpPr>
+        <p:cNvPr id="1" name=""/>
+        <p:cNvGrpSpPr/>
+        <p:nvPr/>
+      </p:nvGrpSpPr>
+      <p:grpSpPr>
+        <a:xfrm>
+          <a:off x="0" y="0"/>
+          <a:ext cx="0" cy="0"/>
+          <a:chOff x="0" y="0"/>
+          <a:chExt cx="0" cy="0"/>
+        </a:xfrm>
+      </p:grpSpPr>
       <p:pic>
         <p:nvPicPr>
-          <p:cNvPr id="5" name="그림 4" descr="텍스트, 디스플레이, 스크린샷이(가) 표시된 사진&#10;&#10;자동 생성된 설명">
+          <p:cNvPr id="6" name="그림 5">
             <a:extLst>
               <a:ext uri="{FF2B5EF4-FFF2-40B4-BE49-F238E27FC236}">
-                <a16:creationId xmlns:a16="http://schemas.microsoft.com/office/drawing/2014/main" id="{D7290EB0-148A-4DA4-88C8-7607A8224E07}"/>
+                <a16:creationId xmlns:a16="http://schemas.microsoft.com/office/drawing/2014/main" id="{2B01EDAC-82BB-40E1-8891-0C957E95AE2E}"/>
               </a:ext>
             </a:extLst>
           </p:cNvPr>
@@ -5782,22 +6579,15 @@
           </p:cNvPicPr>
           <p:nvPr/>
         </p:nvPicPr>
-        <p:blipFill>
-          <a:blip r:embed="rId3">
-            <a:extLst>
-              <a:ext uri="{28A0092B-C50C-407E-A947-70E740481C1C}">
-                <a14:useLocalDpi xmlns:a14="http://schemas.microsoft.com/office/drawing/2010/main" val="0"/>
-              </a:ext>
-            </a:extLst>
-          </a:blip>
-          <a:stretch>
-            <a:fillRect/>
-          </a:stretch>
+        <p:blipFill rotWithShape="1">
+          <a:blip r:embed="rId3"/>
+          <a:srcRect l="8344" t="11855" r="43130" b="20732"/>
+          <a:stretch/>
         </p:blipFill>
         <p:spPr>
           <a:xfrm>
-            <a:off x="4996786" y="2640549"/>
-            <a:ext cx="6962706" cy="7212785"/>
+            <a:off x="562906" y="4671832"/>
+            <a:ext cx="8692032" cy="5094187"/>
           </a:xfrm>
           <a:prstGeom prst="rect">
             <a:avLst/>
@@ -6032,88 +6822,6 @@
           </a:p>
         </p:txBody>
       </p:sp>
-      <p:cxnSp>
-        <p:nvCxnSpPr>
-          <p:cNvPr id="22" name="Google Shape;75;p14">
-            <a:extLst>
-              <a:ext uri="{FF2B5EF4-FFF2-40B4-BE49-F238E27FC236}">
-                <a16:creationId xmlns:a16="http://schemas.microsoft.com/office/drawing/2014/main" id="{843495E0-C68D-4805-9D13-77B58FB4CD1A}"/>
-              </a:ext>
-            </a:extLst>
-          </p:cNvPr>
-          <p:cNvCxnSpPr>
-            <a:cxnSpLocks/>
-          </p:cNvCxnSpPr>
-          <p:nvPr/>
-        </p:nvCxnSpPr>
-        <p:spPr>
-          <a:xfrm>
-            <a:off x="11665307" y="6489539"/>
-            <a:ext cx="1438660" cy="3379"/>
-          </a:xfrm>
-          <a:prstGeom prst="straightConnector1">
-            <a:avLst/>
-          </a:prstGeom>
-          <a:noFill/>
-          <a:ln w="9525" cap="flat" cmpd="sng">
-            <a:solidFill>
-              <a:schemeClr val="dk2"/>
-            </a:solidFill>
-            <a:prstDash val="solid"/>
-            <a:round/>
-            <a:headEnd type="none" w="med" len="med"/>
-            <a:tailEnd type="triangle" w="med" len="med"/>
-          </a:ln>
-        </p:spPr>
-      </p:cxnSp>
-      <p:sp>
-        <p:nvSpPr>
-          <p:cNvPr id="32" name="Google Shape;83;p14">
-            <a:extLst>
-              <a:ext uri="{FF2B5EF4-FFF2-40B4-BE49-F238E27FC236}">
-                <a16:creationId xmlns:a16="http://schemas.microsoft.com/office/drawing/2014/main" id="{B0CA695A-2CDC-4167-B471-BC38A077B08B}"/>
-              </a:ext>
-            </a:extLst>
-          </p:cNvPr>
-          <p:cNvSpPr txBox="1"/>
-          <p:nvPr/>
-        </p:nvSpPr>
-        <p:spPr>
-          <a:xfrm>
-            <a:off x="13169954" y="6250494"/>
-            <a:ext cx="5072756" cy="615523"/>
-          </a:xfrm>
-          <a:prstGeom prst="rect">
-            <a:avLst/>
-          </a:prstGeom>
-          <a:noFill/>
-          <a:ln>
-            <a:noFill/>
-          </a:ln>
-        </p:spPr>
-        <p:txBody>
-          <a:bodyPr spcFirstLastPara="1" wrap="square" lIns="91425" tIns="91425" rIns="91425" bIns="91425" anchor="t" anchorCtr="0">
-            <a:spAutoFit/>
-          </a:bodyPr>
-          <a:lstStyle/>
-          <a:p>
-            <a:pPr marL="0" lvl="0" indent="0" algn="l" rtl="0">
-              <a:spcBef>
-                <a:spcPts val="0"/>
-              </a:spcBef>
-              <a:spcAft>
-                <a:spcPts val="0"/>
-              </a:spcAft>
-              <a:buNone/>
-            </a:pPr>
-            <a:r>
-              <a:rPr lang="ko" sz="2800" b="1" dirty="0"/>
-              <a:t>PictureBox</a:t>
-            </a:r>
-            <a:endParaRPr sz="2800" b="1" dirty="0"/>
-          </a:p>
-        </p:txBody>
-      </p:sp>
       <p:sp>
         <p:nvSpPr>
           <p:cNvPr id="3" name="직사각형 2">
@@ -6128,16 +6836,16 @@
         </p:nvSpPr>
         <p:spPr>
           <a:xfrm>
-            <a:off x="5328069" y="3262376"/>
-            <a:ext cx="6175985" cy="380380"/>
+            <a:off x="2633151" y="6239257"/>
+            <a:ext cx="6019800" cy="2514600"/>
           </a:xfrm>
           <a:prstGeom prst="rect">
             <a:avLst/>
           </a:prstGeom>
           <a:noFill/>
-          <a:ln>
+          <a:ln w="57150">
             <a:solidFill>
-              <a:srgbClr val="7030A0"/>
+              <a:srgbClr val="FF0000"/>
             </a:solidFill>
           </a:ln>
         </p:spPr>
@@ -6183,8 +6891,8 @@
         </p:nvSpPr>
         <p:spPr>
           <a:xfrm>
-            <a:off x="12131956" y="2994196"/>
-            <a:ext cx="4327244" cy="1046410"/>
+            <a:off x="498290" y="2823689"/>
+            <a:ext cx="6324600" cy="1477297"/>
           </a:xfrm>
           <a:prstGeom prst="rect">
             <a:avLst/>
@@ -6210,16 +6918,40 @@
               <a:buNone/>
             </a:pPr>
             <a:r>
-              <a:rPr lang="ko" sz="2800" b="1" dirty="0">
-                <a:latin typeface="맑은 고딕" panose="020B0503020000020004" pitchFamily="50" charset="-127"/>
-                <a:ea typeface="맑은 고딕" panose="020B0503020000020004" pitchFamily="50" charset="-127"/>
-              </a:rPr>
-              <a:t>Label </a:t>
-            </a:r>
-            <a:endParaRPr lang="en-US" altLang="ko" sz="2800" b="1" dirty="0">
-              <a:latin typeface="맑은 고딕" panose="020B0503020000020004" pitchFamily="50" charset="-127"/>
-              <a:ea typeface="맑은 고딕" panose="020B0503020000020004" pitchFamily="50" charset="-127"/>
-            </a:endParaRPr>
+              <a:rPr lang="en-US" altLang="ko-KR" sz="2800" b="1" dirty="0">
+                <a:latin typeface="맑은 고딕" panose="020B0503020000020004" pitchFamily="50" charset="-127"/>
+                <a:ea typeface="맑은 고딕" panose="020B0503020000020004" pitchFamily="50" charset="-127"/>
+              </a:rPr>
+              <a:t>* </a:t>
+            </a:r>
+            <a:r>
+              <a:rPr lang="ko-KR" altLang="en-US" sz="2800" b="1" dirty="0">
+                <a:latin typeface="맑은 고딕" panose="020B0503020000020004" pitchFamily="50" charset="-127"/>
+                <a:ea typeface="맑은 고딕" panose="020B0503020000020004" pitchFamily="50" charset="-127"/>
+              </a:rPr>
+              <a:t>폼 크기 </a:t>
+            </a:r>
+            <a:r>
+              <a:rPr lang="en-US" altLang="ko-KR" sz="2800" b="1" dirty="0">
+                <a:latin typeface="맑은 고딕" panose="020B0503020000020004" pitchFamily="50" charset="-127"/>
+                <a:ea typeface="맑은 고딕" panose="020B0503020000020004" pitchFamily="50" charset="-127"/>
+              </a:rPr>
+              <a:t>=</a:t>
+            </a:r>
+            <a:r>
+              <a:rPr lang="ko-KR" altLang="en-US" sz="2800" b="1" dirty="0">
+                <a:latin typeface="맑은 고딕" panose="020B0503020000020004" pitchFamily="50" charset="-127"/>
+                <a:ea typeface="맑은 고딕" panose="020B0503020000020004" pitchFamily="50" charset="-127"/>
+              </a:rPr>
+              <a:t> 해상도</a:t>
+            </a:r>
+            <a:r>
+              <a:rPr lang="en-US" altLang="ko-KR" sz="2800" b="1" dirty="0">
+                <a:latin typeface="맑은 고딕" panose="020B0503020000020004" pitchFamily="50" charset="-127"/>
+                <a:ea typeface="맑은 고딕" panose="020B0503020000020004" pitchFamily="50" charset="-127"/>
+              </a:rPr>
+              <a:t>/3</a:t>
+            </a:r>
           </a:p>
           <a:p>
             <a:pPr marL="0" lvl="0" indent="0" algn="l" rtl="0">
@@ -6232,46 +6964,125 @@
               <a:buNone/>
             </a:pPr>
             <a:r>
-              <a:rPr lang="en-US" altLang="ko" sz="2800" b="1" dirty="0">
-                <a:latin typeface="맑은 고딕" panose="020B0503020000020004" pitchFamily="50" charset="-127"/>
-                <a:ea typeface="맑은 고딕" panose="020B0503020000020004" pitchFamily="50" charset="-127"/>
-              </a:rPr>
-              <a:t>– </a:t>
+              <a:rPr lang="en-US" altLang="ko-KR" sz="2800" b="1" dirty="0">
+                <a:latin typeface="맑은 고딕" panose="020B0503020000020004" pitchFamily="50" charset="-127"/>
+                <a:ea typeface="맑은 고딕" panose="020B0503020000020004" pitchFamily="50" charset="-127"/>
+              </a:rPr>
+              <a:t>* </a:t>
             </a:r>
             <a:r>
               <a:rPr lang="ko-KR" altLang="en-US" sz="2800" b="1" dirty="0">
                 <a:latin typeface="맑은 고딕" panose="020B0503020000020004" pitchFamily="50" charset="-127"/>
                 <a:ea typeface="맑은 고딕" panose="020B0503020000020004" pitchFamily="50" charset="-127"/>
               </a:rPr>
-              <a:t>학생 정보</a:t>
+              <a:t>폼 위치 </a:t>
             </a:r>
             <a:r>
               <a:rPr lang="en-US" altLang="ko-KR" sz="2800" b="1" dirty="0">
                 <a:latin typeface="맑은 고딕" panose="020B0503020000020004" pitchFamily="50" charset="-127"/>
                 <a:ea typeface="맑은 고딕" panose="020B0503020000020004" pitchFamily="50" charset="-127"/>
               </a:rPr>
-              <a:t>/ </a:t>
+              <a:t>= </a:t>
             </a:r>
             <a:r>
               <a:rPr lang="ko-KR" altLang="en-US" sz="2800" b="1" dirty="0">
                 <a:latin typeface="맑은 고딕" panose="020B0503020000020004" pitchFamily="50" charset="-127"/>
                 <a:ea typeface="맑은 고딕" panose="020B0503020000020004" pitchFamily="50" charset="-127"/>
               </a:rPr>
-              <a:t>촬영시간</a:t>
-            </a:r>
-            <a:endParaRPr sz="2800" b="1" dirty="0">
-              <a:latin typeface="맑은 고딕" panose="020B0503020000020004" pitchFamily="50" charset="-127"/>
-              <a:ea typeface="맑은 고딕" panose="020B0503020000020004" pitchFamily="50" charset="-127"/>
-            </a:endParaRPr>
-          </a:p>
-        </p:txBody>
-      </p:sp>
-      <p:sp>
-        <p:nvSpPr>
-          <p:cNvPr id="36" name="직사각형 35">
+              <a:t>화면너비</a:t>
+            </a:r>
+            <a:r>
+              <a:rPr lang="en-US" altLang="ko-KR" sz="2800" b="1" dirty="0">
+                <a:latin typeface="맑은 고딕" panose="020B0503020000020004" pitchFamily="50" charset="-127"/>
+                <a:ea typeface="맑은 고딕" panose="020B0503020000020004" pitchFamily="50" charset="-127"/>
+              </a:rPr>
+              <a:t>/5, </a:t>
+            </a:r>
+            <a:r>
+              <a:rPr lang="ko-KR" altLang="en-US" sz="2800" b="1" dirty="0">
+                <a:latin typeface="맑은 고딕" panose="020B0503020000020004" pitchFamily="50" charset="-127"/>
+                <a:ea typeface="맑은 고딕" panose="020B0503020000020004" pitchFamily="50" charset="-127"/>
+              </a:rPr>
+              <a:t>화면높이</a:t>
+            </a:r>
+            <a:r>
+              <a:rPr lang="en-US" altLang="ko-KR" sz="2800" b="1" dirty="0">
+                <a:latin typeface="맑은 고딕" panose="020B0503020000020004" pitchFamily="50" charset="-127"/>
+                <a:ea typeface="맑은 고딕" panose="020B0503020000020004" pitchFamily="50" charset="-127"/>
+              </a:rPr>
+              <a:t>/3</a:t>
+            </a:r>
+          </a:p>
+          <a:p>
+            <a:pPr marL="0" lvl="0" indent="0" algn="l" rtl="0">
+              <a:spcBef>
+                <a:spcPts val="0"/>
+              </a:spcBef>
+              <a:spcAft>
+                <a:spcPts val="0"/>
+              </a:spcAft>
+              <a:buNone/>
+            </a:pPr>
+            <a:r>
+              <a:rPr lang="en-US" altLang="ko-KR" sz="2800" b="1" dirty="0">
+                <a:latin typeface="맑은 고딕" panose="020B0503020000020004" pitchFamily="50" charset="-127"/>
+                <a:ea typeface="맑은 고딕" panose="020B0503020000020004" pitchFamily="50" charset="-127"/>
+              </a:rPr>
+              <a:t>* </a:t>
+            </a:r>
+            <a:r>
+              <a:rPr lang="ko-KR" altLang="en-US" sz="2800" b="1" dirty="0">
+                <a:latin typeface="맑은 고딕" panose="020B0503020000020004" pitchFamily="50" charset="-127"/>
+                <a:ea typeface="맑은 고딕" panose="020B0503020000020004" pitchFamily="50" charset="-127"/>
+              </a:rPr>
+              <a:t>크기 조절 </a:t>
+            </a:r>
+            <a:r>
+              <a:rPr lang="en-US" altLang="ko-KR" sz="2800" b="1" dirty="0">
+                <a:latin typeface="맑은 고딕" panose="020B0503020000020004" pitchFamily="50" charset="-127"/>
+                <a:ea typeface="맑은 고딕" panose="020B0503020000020004" pitchFamily="50" charset="-127"/>
+              </a:rPr>
+              <a:t>fix</a:t>
+            </a:r>
+          </a:p>
+        </p:txBody>
+      </p:sp>
+      <p:pic>
+        <p:nvPicPr>
+          <p:cNvPr id="7" name="그림 6">
             <a:extLst>
               <a:ext uri="{FF2B5EF4-FFF2-40B4-BE49-F238E27FC236}">
-                <a16:creationId xmlns:a16="http://schemas.microsoft.com/office/drawing/2014/main" id="{CB6668AF-8781-459B-A4D3-9A2E036012D8}"/>
+                <a16:creationId xmlns:a16="http://schemas.microsoft.com/office/drawing/2014/main" id="{471AD02C-2754-4DA0-BB54-2355EB9D36AC}"/>
+              </a:ext>
+            </a:extLst>
+          </p:cNvPr>
+          <p:cNvPicPr>
+            <a:picLocks noChangeAspect="1"/>
+          </p:cNvPicPr>
+          <p:nvPr/>
+        </p:nvPicPr>
+        <p:blipFill>
+          <a:blip r:embed="rId5"/>
+          <a:stretch>
+            <a:fillRect/>
+          </a:stretch>
+        </p:blipFill>
+        <p:spPr>
+          <a:xfrm>
+            <a:off x="9220580" y="2707629"/>
+            <a:ext cx="8661773" cy="4188964"/>
+          </a:xfrm>
+          <a:prstGeom prst="rect">
+            <a:avLst/>
+          </a:prstGeom>
+        </p:spPr>
+      </p:pic>
+      <p:sp>
+        <p:nvSpPr>
+          <p:cNvPr id="24" name="직사각형 23">
+            <a:extLst>
+              <a:ext uri="{FF2B5EF4-FFF2-40B4-BE49-F238E27FC236}">
+                <a16:creationId xmlns:a16="http://schemas.microsoft.com/office/drawing/2014/main" id="{66027F4D-D3A9-4FF6-AC6E-E61621740D07}"/>
               </a:ext>
             </a:extLst>
           </p:cNvPr>
@@ -6280,16 +7091,16 @@
         </p:nvSpPr>
         <p:spPr>
           <a:xfrm>
-            <a:off x="10013168" y="9298028"/>
-            <a:ext cx="1652139" cy="425432"/>
+            <a:off x="9254937" y="2662122"/>
+            <a:ext cx="8692031" cy="4300088"/>
           </a:xfrm>
           <a:prstGeom prst="rect">
             <a:avLst/>
           </a:prstGeom>
           <a:noFill/>
-          <a:ln>
+          <a:ln w="57150">
             <a:solidFill>
-              <a:srgbClr val="7030A0"/>
+              <a:srgbClr val="FF0000"/>
             </a:solidFill>
           </a:ln>
         </p:spPr>
@@ -6323,10 +7134,10 @@
       </p:sp>
       <p:sp>
         <p:nvSpPr>
-          <p:cNvPr id="37" name="Google Shape;85;p14">
+          <p:cNvPr id="28" name="Google Shape;85;p14">
             <a:extLst>
               <a:ext uri="{FF2B5EF4-FFF2-40B4-BE49-F238E27FC236}">
-                <a16:creationId xmlns:a16="http://schemas.microsoft.com/office/drawing/2014/main" id="{C0769CCB-B352-4FE6-8BC3-64A3C73981FD}"/>
+                <a16:creationId xmlns:a16="http://schemas.microsoft.com/office/drawing/2014/main" id="{4C7A6B60-4A78-4180-BF98-8460BD6D8DB4}"/>
               </a:ext>
             </a:extLst>
           </p:cNvPr>
@@ -6335,8 +7146,8 @@
         </p:nvSpPr>
         <p:spPr>
           <a:xfrm>
-            <a:off x="12202937" y="9173398"/>
-            <a:ext cx="4327244" cy="615523"/>
+            <a:off x="12858151" y="7584878"/>
+            <a:ext cx="5427078" cy="1046410"/>
           </a:xfrm>
           <a:prstGeom prst="rect">
             <a:avLst/>
@@ -6362,121 +7173,332 @@
               <a:buNone/>
             </a:pPr>
             <a:r>
-              <a:rPr lang="en-US" altLang="ko" sz="2800" b="1" dirty="0">
-                <a:latin typeface="맑은 고딕" panose="020B0503020000020004" pitchFamily="50" charset="-127"/>
-                <a:ea typeface="맑은 고딕" panose="020B0503020000020004" pitchFamily="50" charset="-127"/>
-              </a:rPr>
-              <a:t>Button</a:t>
-            </a:r>
-            <a:r>
-              <a:rPr lang="ko" sz="2800" b="1" dirty="0">
-                <a:latin typeface="맑은 고딕" panose="020B0503020000020004" pitchFamily="50" charset="-127"/>
-                <a:ea typeface="맑은 고딕" panose="020B0503020000020004" pitchFamily="50" charset="-127"/>
-              </a:rPr>
-              <a:t> </a:t>
-            </a:r>
-            <a:r>
-              <a:rPr lang="en-US" altLang="ko" sz="2800" b="1" dirty="0">
-                <a:latin typeface="맑은 고딕" panose="020B0503020000020004" pitchFamily="50" charset="-127"/>
-                <a:ea typeface="맑은 고딕" panose="020B0503020000020004" pitchFamily="50" charset="-127"/>
-              </a:rPr>
-              <a:t>(</a:t>
+              <a:rPr lang="en-US" altLang="ko-KR" sz="2800" b="1" dirty="0">
+                <a:latin typeface="맑은 고딕" panose="020B0503020000020004" pitchFamily="50" charset="-127"/>
+                <a:ea typeface="맑은 고딕" panose="020B0503020000020004" pitchFamily="50" charset="-127"/>
+              </a:rPr>
+              <a:t>* </a:t>
             </a:r>
             <a:r>
               <a:rPr lang="ko-KR" altLang="en-US" sz="2800" b="1" dirty="0">
                 <a:latin typeface="맑은 고딕" panose="020B0503020000020004" pitchFamily="50" charset="-127"/>
                 <a:ea typeface="맑은 고딕" panose="020B0503020000020004" pitchFamily="50" charset="-127"/>
               </a:rPr>
-              <a:t>닫기</a:t>
+              <a:t>폼 크기 </a:t>
             </a:r>
             <a:r>
               <a:rPr lang="en-US" altLang="ko-KR" sz="2800" b="1" dirty="0">
                 <a:latin typeface="맑은 고딕" panose="020B0503020000020004" pitchFamily="50" charset="-127"/>
                 <a:ea typeface="맑은 고딕" panose="020B0503020000020004" pitchFamily="50" charset="-127"/>
               </a:rPr>
-              <a:t>)</a:t>
-            </a:r>
-            <a:endParaRPr sz="2800" b="1" dirty="0">
+              <a:t>=</a:t>
+            </a:r>
+            <a:r>
+              <a:rPr lang="ko-KR" altLang="en-US" sz="2800" b="1" dirty="0">
+                <a:latin typeface="맑은 고딕" panose="020B0503020000020004" pitchFamily="50" charset="-127"/>
+                <a:ea typeface="맑은 고딕" panose="020B0503020000020004" pitchFamily="50" charset="-127"/>
+              </a:rPr>
+              <a:t> 전체화면</a:t>
+            </a:r>
+            <a:endParaRPr lang="en-US" altLang="ko-KR" sz="2800" b="1" dirty="0">
               <a:latin typeface="맑은 고딕" panose="020B0503020000020004" pitchFamily="50" charset="-127"/>
               <a:ea typeface="맑은 고딕" panose="020B0503020000020004" pitchFamily="50" charset="-127"/>
             </a:endParaRPr>
           </a:p>
+          <a:p>
+            <a:pPr marL="0" lvl="0" indent="0" algn="l" rtl="0">
+              <a:spcBef>
+                <a:spcPts val="0"/>
+              </a:spcBef>
+              <a:spcAft>
+                <a:spcPts val="0"/>
+              </a:spcAft>
+              <a:buNone/>
+            </a:pPr>
+            <a:r>
+              <a:rPr lang="en-US" altLang="ko-KR" sz="2800" b="1" dirty="0">
+                <a:latin typeface="맑은 고딕" panose="020B0503020000020004" pitchFamily="50" charset="-127"/>
+                <a:ea typeface="맑은 고딕" panose="020B0503020000020004" pitchFamily="50" charset="-127"/>
+              </a:rPr>
+              <a:t>* </a:t>
+            </a:r>
+            <a:r>
+              <a:rPr lang="ko-KR" altLang="en-US" sz="2800" b="1" dirty="0">
+                <a:latin typeface="맑은 고딕" panose="020B0503020000020004" pitchFamily="50" charset="-127"/>
+                <a:ea typeface="맑은 고딕" panose="020B0503020000020004" pitchFamily="50" charset="-127"/>
+              </a:rPr>
+              <a:t>정보</a:t>
+            </a:r>
+            <a:r>
+              <a:rPr lang="en-US" altLang="ko-KR" sz="2800" b="1" dirty="0">
+                <a:latin typeface="맑은 고딕" panose="020B0503020000020004" pitchFamily="50" charset="-127"/>
+                <a:ea typeface="맑은 고딕" panose="020B0503020000020004" pitchFamily="50" charset="-127"/>
+              </a:rPr>
+              <a:t> / </a:t>
+            </a:r>
+            <a:r>
+              <a:rPr lang="ko-KR" altLang="en-US" sz="2800" b="1" dirty="0">
+                <a:latin typeface="맑은 고딕" panose="020B0503020000020004" pitchFamily="50" charset="-127"/>
+                <a:ea typeface="맑은 고딕" panose="020B0503020000020004" pitchFamily="50" charset="-127"/>
+              </a:rPr>
+              <a:t>확인버튼 </a:t>
+            </a:r>
+            <a:r>
+              <a:rPr lang="en-US" altLang="ko-KR" sz="2800" b="1" dirty="0">
+                <a:latin typeface="맑은 고딕" panose="020B0503020000020004" pitchFamily="50" charset="-127"/>
+                <a:ea typeface="맑은 고딕" panose="020B0503020000020004" pitchFamily="50" charset="-127"/>
+              </a:rPr>
+              <a:t>Visible=False</a:t>
+            </a:r>
+          </a:p>
+        </p:txBody>
+      </p:sp>
+      <p:sp>
+        <p:nvSpPr>
+          <p:cNvPr id="29" name="Google Shape;85;p14">
+            <a:extLst>
+              <a:ext uri="{FF2B5EF4-FFF2-40B4-BE49-F238E27FC236}">
+                <a16:creationId xmlns:a16="http://schemas.microsoft.com/office/drawing/2014/main" id="{F644808C-7B5B-46E1-A504-F4726DFA9C44}"/>
+              </a:ext>
+            </a:extLst>
+          </p:cNvPr>
+          <p:cNvSpPr txBox="1"/>
+          <p:nvPr/>
+        </p:nvSpPr>
+        <p:spPr>
+          <a:xfrm>
+            <a:off x="8741996" y="7685163"/>
+            <a:ext cx="3962400" cy="615523"/>
+          </a:xfrm>
+          <a:prstGeom prst="rect">
+            <a:avLst/>
+          </a:prstGeom>
+          <a:solidFill>
+            <a:schemeClr val="bg1"/>
+          </a:solidFill>
+          <a:ln>
+            <a:noFill/>
+          </a:ln>
+        </p:spPr>
+        <p:txBody>
+          <a:bodyPr spcFirstLastPara="1" wrap="square" lIns="91425" tIns="91425" rIns="91425" bIns="91425" anchor="t" anchorCtr="0">
+            <a:spAutoFit/>
+          </a:bodyPr>
+          <a:lstStyle/>
+          <a:p>
+            <a:pPr marL="0" lvl="0" indent="0" algn="l" rtl="0">
+              <a:spcBef>
+                <a:spcPts val="0"/>
+              </a:spcBef>
+              <a:spcAft>
+                <a:spcPts val="0"/>
+              </a:spcAft>
+              <a:buNone/>
+            </a:pPr>
+            <a:r>
+              <a:rPr lang="en-US" altLang="ko-KR" sz="2800" b="1" dirty="0">
+                <a:solidFill>
+                  <a:srgbClr val="FF0000"/>
+                </a:solidFill>
+                <a:latin typeface="맑은 고딕" panose="020B0503020000020004" pitchFamily="50" charset="-127"/>
+                <a:ea typeface="맑은 고딕" panose="020B0503020000020004" pitchFamily="50" charset="-127"/>
+              </a:rPr>
+              <a:t>* </a:t>
+            </a:r>
+            <a:r>
+              <a:rPr lang="ko-KR" altLang="en-US" sz="2800" b="1" dirty="0">
+                <a:solidFill>
+                  <a:srgbClr val="FF0000"/>
+                </a:solidFill>
+                <a:latin typeface="맑은 고딕" panose="020B0503020000020004" pitchFamily="50" charset="-127"/>
+                <a:ea typeface="맑은 고딕" panose="020B0503020000020004" pitchFamily="50" charset="-127"/>
+              </a:rPr>
+              <a:t>이벤트 </a:t>
+            </a:r>
+            <a:r>
+              <a:rPr lang="en-US" altLang="ko-KR" sz="2800" b="1" dirty="0">
+                <a:solidFill>
+                  <a:srgbClr val="FF0000"/>
+                </a:solidFill>
+                <a:latin typeface="맑은 고딕" panose="020B0503020000020004" pitchFamily="50" charset="-127"/>
+                <a:ea typeface="맑은 고딕" panose="020B0503020000020004" pitchFamily="50" charset="-127"/>
+              </a:rPr>
+              <a:t>Double Click</a:t>
+            </a:r>
+          </a:p>
         </p:txBody>
       </p:sp>
       <p:cxnSp>
         <p:nvCxnSpPr>
-          <p:cNvPr id="38" name="Google Shape;75;p14">
+          <p:cNvPr id="17" name="연결선: 꺾임 16">
             <a:extLst>
               <a:ext uri="{FF2B5EF4-FFF2-40B4-BE49-F238E27FC236}">
-                <a16:creationId xmlns:a16="http://schemas.microsoft.com/office/drawing/2014/main" id="{2764D1E3-A0F2-4F8B-9FD2-195161161DC8}"/>
+                <a16:creationId xmlns:a16="http://schemas.microsoft.com/office/drawing/2014/main" id="{5FBAC444-4AED-475C-BACB-D4E846CB7F73}"/>
               </a:ext>
             </a:extLst>
           </p:cNvPr>
           <p:cNvCxnSpPr>
             <a:cxnSpLocks/>
-            <a:endCxn id="26" idx="1"/>
+            <a:stCxn id="3" idx="3"/>
+            <a:endCxn id="24" idx="2"/>
           </p:cNvCxnSpPr>
           <p:nvPr/>
         </p:nvCxnSpPr>
         <p:spPr>
-          <a:xfrm>
-            <a:off x="11501706" y="3491170"/>
-            <a:ext cx="630250" cy="26231"/>
-          </a:xfrm>
-          <a:prstGeom prst="straightConnector1">
-            <a:avLst/>
-          </a:prstGeom>
-          <a:noFill/>
-          <a:ln w="9525" cap="flat" cmpd="sng">
+          <a:xfrm flipV="1">
+            <a:off x="8652951" y="6962210"/>
+            <a:ext cx="4948002" cy="534347"/>
+          </a:xfrm>
+          <a:prstGeom prst="bentConnector2">
+            <a:avLst/>
+          </a:prstGeom>
+          <a:ln w="28575">
             <a:solidFill>
-              <a:schemeClr val="dk2"/>
+              <a:srgbClr val="FF0000"/>
             </a:solidFill>
-            <a:prstDash val="solid"/>
-            <a:round/>
-            <a:headEnd type="none" w="med" len="med"/>
-            <a:tailEnd type="triangle" w="med" len="med"/>
+            <a:tailEnd type="triangle" w="lg" len="lg"/>
           </a:ln>
         </p:spPr>
+        <p:style>
+          <a:lnRef idx="1">
+            <a:schemeClr val="accent2"/>
+          </a:lnRef>
+          <a:fillRef idx="0">
+            <a:schemeClr val="accent2"/>
+          </a:fillRef>
+          <a:effectRef idx="0">
+            <a:schemeClr val="accent2"/>
+          </a:effectRef>
+          <a:fontRef idx="minor">
+            <a:schemeClr val="tx1"/>
+          </a:fontRef>
+        </p:style>
       </p:cxnSp>
       <p:cxnSp>
         <p:nvCxnSpPr>
-          <p:cNvPr id="39" name="Google Shape;75;p14">
+          <p:cNvPr id="21" name="연결선: 꺾임 20">
             <a:extLst>
               <a:ext uri="{FF2B5EF4-FFF2-40B4-BE49-F238E27FC236}">
-                <a16:creationId xmlns:a16="http://schemas.microsoft.com/office/drawing/2014/main" id="{022B37DC-9A79-4F5E-A81D-E5753F629FC9}"/>
+                <a16:creationId xmlns:a16="http://schemas.microsoft.com/office/drawing/2014/main" id="{8C3DA3D5-9FC5-445F-A26B-8100A4B4CF47}"/>
               </a:ext>
             </a:extLst>
           </p:cNvPr>
           <p:cNvCxnSpPr>
             <a:cxnSpLocks/>
-            <a:endCxn id="37" idx="1"/>
+            <a:stCxn id="24" idx="1"/>
+            <a:endCxn id="3" idx="0"/>
           </p:cNvCxnSpPr>
           <p:nvPr/>
         </p:nvCxnSpPr>
         <p:spPr>
-          <a:xfrm>
-            <a:off x="11665307" y="9463782"/>
-            <a:ext cx="537630" cy="17378"/>
-          </a:xfrm>
-          <a:prstGeom prst="straightConnector1">
-            <a:avLst/>
-          </a:prstGeom>
-          <a:noFill/>
-          <a:ln w="9525" cap="flat" cmpd="sng">
+          <a:xfrm rot="10800000" flipV="1">
+            <a:off x="5643051" y="4812165"/>
+            <a:ext cx="3611886" cy="1427091"/>
+          </a:xfrm>
+          <a:prstGeom prst="bentConnector2">
+            <a:avLst/>
+          </a:prstGeom>
+          <a:ln w="28575">
             <a:solidFill>
-              <a:schemeClr val="dk2"/>
+              <a:srgbClr val="FF0000"/>
             </a:solidFill>
-            <a:prstDash val="solid"/>
-            <a:round/>
-            <a:headEnd type="none" w="med" len="med"/>
-            <a:tailEnd type="triangle" w="med" len="med"/>
+            <a:tailEnd type="triangle" w="lg" len="lg"/>
           </a:ln>
         </p:spPr>
+        <p:style>
+          <a:lnRef idx="1">
+            <a:schemeClr val="accent1"/>
+          </a:lnRef>
+          <a:fillRef idx="0">
+            <a:schemeClr val="accent1"/>
+          </a:fillRef>
+          <a:effectRef idx="0">
+            <a:schemeClr val="accent1"/>
+          </a:effectRef>
+          <a:fontRef idx="minor">
+            <a:schemeClr val="tx1"/>
+          </a:fontRef>
+        </p:style>
       </p:cxnSp>
+      <p:sp>
+        <p:nvSpPr>
+          <p:cNvPr id="40" name="Google Shape;85;p14">
+            <a:extLst>
+              <a:ext uri="{FF2B5EF4-FFF2-40B4-BE49-F238E27FC236}">
+                <a16:creationId xmlns:a16="http://schemas.microsoft.com/office/drawing/2014/main" id="{DBB9E9B9-98E1-4E1D-AF3B-42E7B6B89686}"/>
+              </a:ext>
+            </a:extLst>
+          </p:cNvPr>
+          <p:cNvSpPr txBox="1"/>
+          <p:nvPr/>
+        </p:nvSpPr>
+        <p:spPr>
+          <a:xfrm>
+            <a:off x="5260230" y="4077331"/>
+            <a:ext cx="3962400" cy="615523"/>
+          </a:xfrm>
+          <a:prstGeom prst="rect">
+            <a:avLst/>
+          </a:prstGeom>
+          <a:solidFill>
+            <a:schemeClr val="bg1"/>
+          </a:solidFill>
+          <a:ln>
+            <a:noFill/>
+          </a:ln>
+        </p:spPr>
+        <p:txBody>
+          <a:bodyPr spcFirstLastPara="1" wrap="square" lIns="91425" tIns="91425" rIns="91425" bIns="91425" anchor="t" anchorCtr="0">
+            <a:spAutoFit/>
+          </a:bodyPr>
+          <a:lstStyle/>
+          <a:p>
+            <a:pPr marL="0" lvl="0" indent="0" algn="l" rtl="0">
+              <a:spcBef>
+                <a:spcPts val="0"/>
+              </a:spcBef>
+              <a:spcAft>
+                <a:spcPts val="0"/>
+              </a:spcAft>
+              <a:buNone/>
+            </a:pPr>
+            <a:r>
+              <a:rPr lang="en-US" altLang="ko-KR" sz="2800" b="1" dirty="0">
+                <a:solidFill>
+                  <a:srgbClr val="FF0000"/>
+                </a:solidFill>
+                <a:latin typeface="맑은 고딕" panose="020B0503020000020004" pitchFamily="50" charset="-127"/>
+                <a:ea typeface="맑은 고딕" panose="020B0503020000020004" pitchFamily="50" charset="-127"/>
+              </a:rPr>
+              <a:t>* </a:t>
+            </a:r>
+            <a:r>
+              <a:rPr lang="ko-KR" altLang="en-US" sz="2800" b="1" dirty="0">
+                <a:solidFill>
+                  <a:srgbClr val="FF0000"/>
+                </a:solidFill>
+                <a:latin typeface="맑은 고딕" panose="020B0503020000020004" pitchFamily="50" charset="-127"/>
+                <a:ea typeface="맑은 고딕" panose="020B0503020000020004" pitchFamily="50" charset="-127"/>
+              </a:rPr>
+              <a:t>이벤트 </a:t>
+            </a:r>
+            <a:r>
+              <a:rPr lang="en-US" altLang="ko-KR" sz="2800" b="1" dirty="0">
+                <a:solidFill>
+                  <a:srgbClr val="FF0000"/>
+                </a:solidFill>
+                <a:latin typeface="맑은 고딕" panose="020B0503020000020004" pitchFamily="50" charset="-127"/>
+                <a:ea typeface="맑은 고딕" panose="020B0503020000020004" pitchFamily="50" charset="-127"/>
+              </a:rPr>
+              <a:t>Double Click</a:t>
+            </a:r>
+          </a:p>
+        </p:txBody>
+      </p:sp>
     </p:spTree>
     <p:extLst>
       <p:ext uri="{BB962C8B-B14F-4D97-AF65-F5344CB8AC3E}">
-        <p14:creationId xmlns:p14="http://schemas.microsoft.com/office/powerpoint/2010/main" val="2569205514"/>
+        <p14:creationId xmlns:p14="http://schemas.microsoft.com/office/powerpoint/2010/main" val="1523459026"/>
       </p:ext>
     </p:extLst>
   </p:cSld>
@@ -6486,7 +7508,7 @@
 </p:sld>
 </file>
 
-<file path=ppt/slides/slide11.xml><?xml version="1.0" encoding="utf-8"?>
+<file path=ppt/slides/slide12.xml><?xml version="1.0" encoding="utf-8"?>
 <p:sld xmlns:a="http://schemas.openxmlformats.org/drawingml/2006/main" xmlns:r="http://schemas.openxmlformats.org/officeDocument/2006/relationships" xmlns:p="http://schemas.openxmlformats.org/presentationml/2006/main">
   <p:cSld>
     <p:bg>
@@ -7419,7 +8441,7 @@
 </p:sld>
 </file>
 
-<file path=ppt/slides/slide12.xml><?xml version="1.0" encoding="utf-8"?>
+<file path=ppt/slides/slide13.xml><?xml version="1.0" encoding="utf-8"?>
 <p:sld xmlns:a="http://schemas.openxmlformats.org/drawingml/2006/main" xmlns:r="http://schemas.openxmlformats.org/officeDocument/2006/relationships" xmlns:p="http://schemas.openxmlformats.org/presentationml/2006/main">
   <p:cSld>
     <p:bg>
@@ -8379,7 +9401,7 @@
 </p:sld>
 </file>
 
-<file path=ppt/slides/slide13.xml><?xml version="1.0" encoding="utf-8"?>
+<file path=ppt/slides/slide14.xml><?xml version="1.0" encoding="utf-8"?>
 <p:sld xmlns:a="http://schemas.openxmlformats.org/drawingml/2006/main" xmlns:r="http://schemas.openxmlformats.org/officeDocument/2006/relationships" xmlns:p="http://schemas.openxmlformats.org/presentationml/2006/main">
   <p:cSld>
     <p:bg>
@@ -8797,7 +9819,7 @@
 </p:sld>
 </file>
 
-<file path=ppt/slides/slide14.xml><?xml version="1.0" encoding="utf-8"?>
+<file path=ppt/slides/slide15.xml><?xml version="1.0" encoding="utf-8"?>
 <p:sld xmlns:a="http://schemas.openxmlformats.org/drawingml/2006/main" xmlns:r="http://schemas.openxmlformats.org/officeDocument/2006/relationships" xmlns:p="http://schemas.openxmlformats.org/presentationml/2006/main">
   <p:cSld>
     <p:bg>

</xml_diff>